<commit_message>
M6 Project. First of final updates
</commit_message>
<xml_diff>
--- a/CAS_project/figures.pptx
+++ b/CAS_project/figures.pptx
@@ -198,7 +198,7 @@
           <a:p>
             <a:fld id="{AEE19CC6-9619-1248-8D80-F45A17382EB4}" type="datetimeFigureOut">
               <a:rPr lang="en-GB" smtClean="0"/>
-              <a:t>18/04/2024</a:t>
+              <a:t>06/05/2024</a:t>
             </a:fld>
             <a:endParaRPr lang="en-GB"/>
           </a:p>
@@ -680,7 +680,7 @@
           <a:p>
             <a:fld id="{FABAE490-0A31-9944-8C10-D3082C1F3F1E}" type="datetimeFigureOut">
               <a:rPr lang="en-GB" smtClean="0"/>
-              <a:t>18/04/2024</a:t>
+              <a:t>06/05/2024</a:t>
             </a:fld>
             <a:endParaRPr lang="en-GB"/>
           </a:p>
@@ -850,7 +850,7 @@
           <a:p>
             <a:fld id="{FABAE490-0A31-9944-8C10-D3082C1F3F1E}" type="datetimeFigureOut">
               <a:rPr lang="en-GB" smtClean="0"/>
-              <a:t>18/04/2024</a:t>
+              <a:t>06/05/2024</a:t>
             </a:fld>
             <a:endParaRPr lang="en-GB"/>
           </a:p>
@@ -1030,7 +1030,7 @@
           <a:p>
             <a:fld id="{FABAE490-0A31-9944-8C10-D3082C1F3F1E}" type="datetimeFigureOut">
               <a:rPr lang="en-GB" smtClean="0"/>
-              <a:t>18/04/2024</a:t>
+              <a:t>06/05/2024</a:t>
             </a:fld>
             <a:endParaRPr lang="en-GB"/>
           </a:p>
@@ -1200,7 +1200,7 @@
           <a:p>
             <a:fld id="{FABAE490-0A31-9944-8C10-D3082C1F3F1E}" type="datetimeFigureOut">
               <a:rPr lang="en-GB" smtClean="0"/>
-              <a:t>18/04/2024</a:t>
+              <a:t>06/05/2024</a:t>
             </a:fld>
             <a:endParaRPr lang="en-GB"/>
           </a:p>
@@ -1444,7 +1444,7 @@
           <a:p>
             <a:fld id="{FABAE490-0A31-9944-8C10-D3082C1F3F1E}" type="datetimeFigureOut">
               <a:rPr lang="en-GB" smtClean="0"/>
-              <a:t>18/04/2024</a:t>
+              <a:t>06/05/2024</a:t>
             </a:fld>
             <a:endParaRPr lang="en-GB"/>
           </a:p>
@@ -1676,7 +1676,7 @@
           <a:p>
             <a:fld id="{FABAE490-0A31-9944-8C10-D3082C1F3F1E}" type="datetimeFigureOut">
               <a:rPr lang="en-GB" smtClean="0"/>
-              <a:t>18/04/2024</a:t>
+              <a:t>06/05/2024</a:t>
             </a:fld>
             <a:endParaRPr lang="en-GB"/>
           </a:p>
@@ -2043,7 +2043,7 @@
           <a:p>
             <a:fld id="{FABAE490-0A31-9944-8C10-D3082C1F3F1E}" type="datetimeFigureOut">
               <a:rPr lang="en-GB" smtClean="0"/>
-              <a:t>18/04/2024</a:t>
+              <a:t>06/05/2024</a:t>
             </a:fld>
             <a:endParaRPr lang="en-GB"/>
           </a:p>
@@ -2161,7 +2161,7 @@
           <a:p>
             <a:fld id="{FABAE490-0A31-9944-8C10-D3082C1F3F1E}" type="datetimeFigureOut">
               <a:rPr lang="en-GB" smtClean="0"/>
-              <a:t>18/04/2024</a:t>
+              <a:t>06/05/2024</a:t>
             </a:fld>
             <a:endParaRPr lang="en-GB"/>
           </a:p>
@@ -2256,7 +2256,7 @@
           <a:p>
             <a:fld id="{FABAE490-0A31-9944-8C10-D3082C1F3F1E}" type="datetimeFigureOut">
               <a:rPr lang="en-GB" smtClean="0"/>
-              <a:t>18/04/2024</a:t>
+              <a:t>06/05/2024</a:t>
             </a:fld>
             <a:endParaRPr lang="en-GB"/>
           </a:p>
@@ -2533,7 +2533,7 @@
           <a:p>
             <a:fld id="{FABAE490-0A31-9944-8C10-D3082C1F3F1E}" type="datetimeFigureOut">
               <a:rPr lang="en-GB" smtClean="0"/>
-              <a:t>18/04/2024</a:t>
+              <a:t>06/05/2024</a:t>
             </a:fld>
             <a:endParaRPr lang="en-GB"/>
           </a:p>
@@ -2790,7 +2790,7 @@
           <a:p>
             <a:fld id="{FABAE490-0A31-9944-8C10-D3082C1F3F1E}" type="datetimeFigureOut">
               <a:rPr lang="en-GB" smtClean="0"/>
-              <a:t>18/04/2024</a:t>
+              <a:t>06/05/2024</a:t>
             </a:fld>
             <a:endParaRPr lang="en-GB"/>
           </a:p>
@@ -3003,7 +3003,7 @@
           <a:p>
             <a:fld id="{FABAE490-0A31-9944-8C10-D3082C1F3F1E}" type="datetimeFigureOut">
               <a:rPr lang="en-GB" smtClean="0"/>
-              <a:t>18/04/2024</a:t>
+              <a:t>06/05/2024</a:t>
             </a:fld>
             <a:endParaRPr lang="en-GB"/>
           </a:p>

</xml_diff>

<commit_message>
Final project. Validation run and visualisation completed.
</commit_message>
<xml_diff>
--- a/CAS_project/figures.pptx
+++ b/CAS_project/figures.pptx
@@ -5,11 +5,12 @@
     <p:sldMasterId id="2147483660" r:id="rId1"/>
   </p:sldMasterIdLst>
   <p:notesMasterIdLst>
-    <p:notesMasterId r:id="rId4"/>
+    <p:notesMasterId r:id="rId5"/>
   </p:notesMasterIdLst>
   <p:sldIdLst>
     <p:sldId id="256" r:id="rId2"/>
     <p:sldId id="257" r:id="rId3"/>
+    <p:sldId id="258" r:id="rId4"/>
   </p:sldIdLst>
   <p:sldSz cx="14400213" cy="21599525"/>
   <p:notesSz cx="6858000" cy="9144000"/>
@@ -198,7 +199,7 @@
           <a:p>
             <a:fld id="{AEE19CC6-9619-1248-8D80-F45A17382EB4}" type="datetimeFigureOut">
               <a:rPr lang="en-GB" smtClean="0"/>
-              <a:t>06/05/2024</a:t>
+              <a:t>08/08/2025</a:t>
             </a:fld>
             <a:endParaRPr lang="en-GB"/>
           </a:p>
@@ -680,7 +681,7 @@
           <a:p>
             <a:fld id="{FABAE490-0A31-9944-8C10-D3082C1F3F1E}" type="datetimeFigureOut">
               <a:rPr lang="en-GB" smtClean="0"/>
-              <a:t>06/05/2024</a:t>
+              <a:t>08/08/2025</a:t>
             </a:fld>
             <a:endParaRPr lang="en-GB"/>
           </a:p>
@@ -850,7 +851,7 @@
           <a:p>
             <a:fld id="{FABAE490-0A31-9944-8C10-D3082C1F3F1E}" type="datetimeFigureOut">
               <a:rPr lang="en-GB" smtClean="0"/>
-              <a:t>06/05/2024</a:t>
+              <a:t>08/08/2025</a:t>
             </a:fld>
             <a:endParaRPr lang="en-GB"/>
           </a:p>
@@ -1030,7 +1031,7 @@
           <a:p>
             <a:fld id="{FABAE490-0A31-9944-8C10-D3082C1F3F1E}" type="datetimeFigureOut">
               <a:rPr lang="en-GB" smtClean="0"/>
-              <a:t>06/05/2024</a:t>
+              <a:t>08/08/2025</a:t>
             </a:fld>
             <a:endParaRPr lang="en-GB"/>
           </a:p>
@@ -1200,7 +1201,7 @@
           <a:p>
             <a:fld id="{FABAE490-0A31-9944-8C10-D3082C1F3F1E}" type="datetimeFigureOut">
               <a:rPr lang="en-GB" smtClean="0"/>
-              <a:t>06/05/2024</a:t>
+              <a:t>08/08/2025</a:t>
             </a:fld>
             <a:endParaRPr lang="en-GB"/>
           </a:p>
@@ -1444,7 +1445,7 @@
           <a:p>
             <a:fld id="{FABAE490-0A31-9944-8C10-D3082C1F3F1E}" type="datetimeFigureOut">
               <a:rPr lang="en-GB" smtClean="0"/>
-              <a:t>06/05/2024</a:t>
+              <a:t>08/08/2025</a:t>
             </a:fld>
             <a:endParaRPr lang="en-GB"/>
           </a:p>
@@ -1676,7 +1677,7 @@
           <a:p>
             <a:fld id="{FABAE490-0A31-9944-8C10-D3082C1F3F1E}" type="datetimeFigureOut">
               <a:rPr lang="en-GB" smtClean="0"/>
-              <a:t>06/05/2024</a:t>
+              <a:t>08/08/2025</a:t>
             </a:fld>
             <a:endParaRPr lang="en-GB"/>
           </a:p>
@@ -2043,7 +2044,7 @@
           <a:p>
             <a:fld id="{FABAE490-0A31-9944-8C10-D3082C1F3F1E}" type="datetimeFigureOut">
               <a:rPr lang="en-GB" smtClean="0"/>
-              <a:t>06/05/2024</a:t>
+              <a:t>08/08/2025</a:t>
             </a:fld>
             <a:endParaRPr lang="en-GB"/>
           </a:p>
@@ -2161,7 +2162,7 @@
           <a:p>
             <a:fld id="{FABAE490-0A31-9944-8C10-D3082C1F3F1E}" type="datetimeFigureOut">
               <a:rPr lang="en-GB" smtClean="0"/>
-              <a:t>06/05/2024</a:t>
+              <a:t>08/08/2025</a:t>
             </a:fld>
             <a:endParaRPr lang="en-GB"/>
           </a:p>
@@ -2256,7 +2257,7 @@
           <a:p>
             <a:fld id="{FABAE490-0A31-9944-8C10-D3082C1F3F1E}" type="datetimeFigureOut">
               <a:rPr lang="en-GB" smtClean="0"/>
-              <a:t>06/05/2024</a:t>
+              <a:t>08/08/2025</a:t>
             </a:fld>
             <a:endParaRPr lang="en-GB"/>
           </a:p>
@@ -2533,7 +2534,7 @@
           <a:p>
             <a:fld id="{FABAE490-0A31-9944-8C10-D3082C1F3F1E}" type="datetimeFigureOut">
               <a:rPr lang="en-GB" smtClean="0"/>
-              <a:t>06/05/2024</a:t>
+              <a:t>08/08/2025</a:t>
             </a:fld>
             <a:endParaRPr lang="en-GB"/>
           </a:p>
@@ -2790,7 +2791,7 @@
           <a:p>
             <a:fld id="{FABAE490-0A31-9944-8C10-D3082C1F3F1E}" type="datetimeFigureOut">
               <a:rPr lang="en-GB" smtClean="0"/>
-              <a:t>06/05/2024</a:t>
+              <a:t>08/08/2025</a:t>
             </a:fld>
             <a:endParaRPr lang="en-GB"/>
           </a:p>
@@ -3003,7 +3004,7 @@
           <a:p>
             <a:fld id="{FABAE490-0A31-9944-8C10-D3082C1F3F1E}" type="datetimeFigureOut">
               <a:rPr lang="en-GB" smtClean="0"/>
-              <a:t>06/05/2024</a:t>
+              <a:t>08/08/2025</a:t>
             </a:fld>
             <a:endParaRPr lang="en-GB"/>
           </a:p>
@@ -10427,6 +10428,2867 @@
 </p:sld>
 </file>
 
+<file path=ppt/slides/slide3.xml><?xml version="1.0" encoding="utf-8"?>
+<p:sld xmlns:a="http://schemas.openxmlformats.org/drawingml/2006/main" xmlns:r="http://schemas.openxmlformats.org/officeDocument/2006/relationships" xmlns:p="http://schemas.openxmlformats.org/presentationml/2006/main">
+  <p:cSld>
+    <p:spTree>
+      <p:nvGrpSpPr>
+        <p:cNvPr id="1" name="">
+          <a:extLst>
+            <a:ext uri="{FF2B5EF4-FFF2-40B4-BE49-F238E27FC236}">
+              <a16:creationId xmlns:a16="http://schemas.microsoft.com/office/drawing/2014/main" id="{5D12FD94-283E-6587-69C9-D971A4DE4F60}"/>
+            </a:ext>
+          </a:extLst>
+        </p:cNvPr>
+        <p:cNvGrpSpPr/>
+        <p:nvPr/>
+      </p:nvGrpSpPr>
+      <p:grpSpPr>
+        <a:xfrm>
+          <a:off x="0" y="0"/>
+          <a:ext cx="0" cy="0"/>
+          <a:chOff x="0" y="0"/>
+          <a:chExt cx="0" cy="0"/>
+        </a:xfrm>
+      </p:grpSpPr>
+      <p:grpSp>
+        <p:nvGrpSpPr>
+          <p:cNvPr id="10" name="Group 9">
+            <a:extLst>
+              <a:ext uri="{FF2B5EF4-FFF2-40B4-BE49-F238E27FC236}">
+                <a16:creationId xmlns:a16="http://schemas.microsoft.com/office/drawing/2014/main" id="{976CB0F3-FBBB-D2BC-681E-C3102A118DC9}"/>
+              </a:ext>
+            </a:extLst>
+          </p:cNvPr>
+          <p:cNvGrpSpPr/>
+          <p:nvPr/>
+        </p:nvGrpSpPr>
+        <p:grpSpPr>
+          <a:xfrm>
+            <a:off x="1600199" y="475803"/>
+            <a:ext cx="6493711" cy="1366523"/>
+            <a:chOff x="2677884" y="315686"/>
+            <a:chExt cx="6313716" cy="1366523"/>
+          </a:xfrm>
+        </p:grpSpPr>
+        <p:sp>
+          <p:nvSpPr>
+            <p:cNvPr id="2" name="Down Arrow Callout 1">
+              <a:extLst>
+                <a:ext uri="{FF2B5EF4-FFF2-40B4-BE49-F238E27FC236}">
+                  <a16:creationId xmlns:a16="http://schemas.microsoft.com/office/drawing/2014/main" id="{BD2A375F-17AD-F3DA-4D5B-9E73BCFF911A}"/>
+                </a:ext>
+              </a:extLst>
+            </p:cNvPr>
+            <p:cNvSpPr/>
+            <p:nvPr/>
+          </p:nvSpPr>
+          <p:spPr>
+            <a:xfrm>
+              <a:off x="2677885" y="601752"/>
+              <a:ext cx="6313715" cy="1080457"/>
+            </a:xfrm>
+            <a:prstGeom prst="downArrowCallout">
+              <a:avLst>
+                <a:gd name="adj1" fmla="val 132914"/>
+                <a:gd name="adj2" fmla="val 102698"/>
+                <a:gd name="adj3" fmla="val 25000"/>
+                <a:gd name="adj4" fmla="val 64977"/>
+              </a:avLst>
+            </a:prstGeom>
+            <a:solidFill>
+              <a:schemeClr val="accent6"/>
+            </a:solidFill>
+            <a:ln>
+              <a:solidFill>
+                <a:schemeClr val="accent6">
+                  <a:lumMod val="75000"/>
+                </a:schemeClr>
+              </a:solidFill>
+            </a:ln>
+          </p:spPr>
+          <p:style>
+            <a:lnRef idx="2">
+              <a:schemeClr val="accent1">
+                <a:shade val="15000"/>
+              </a:schemeClr>
+            </a:lnRef>
+            <a:fillRef idx="1">
+              <a:schemeClr val="accent1"/>
+            </a:fillRef>
+            <a:effectRef idx="0">
+              <a:schemeClr val="accent1"/>
+            </a:effectRef>
+            <a:fontRef idx="minor">
+              <a:schemeClr val="lt1"/>
+            </a:fontRef>
+          </p:style>
+          <p:txBody>
+            <a:bodyPr rtlCol="0" anchor="ctr"/>
+            <a:lstStyle/>
+            <a:p>
+              <a:pPr algn="ctr"/>
+              <a:endParaRPr lang="en-GB">
+                <a:solidFill>
+                  <a:sysClr val="windowText" lastClr="000000"/>
+                </a:solidFill>
+              </a:endParaRPr>
+            </a:p>
+          </p:txBody>
+        </p:sp>
+        <p:sp>
+          <p:nvSpPr>
+            <p:cNvPr id="4" name="Rectangle 3">
+              <a:extLst>
+                <a:ext uri="{FF2B5EF4-FFF2-40B4-BE49-F238E27FC236}">
+                  <a16:creationId xmlns:a16="http://schemas.microsoft.com/office/drawing/2014/main" id="{1DBE2AC6-81F9-D644-F747-76C9E7519EF4}"/>
+                </a:ext>
+              </a:extLst>
+            </p:cNvPr>
+            <p:cNvSpPr/>
+            <p:nvPr/>
+          </p:nvSpPr>
+          <p:spPr>
+            <a:xfrm>
+              <a:off x="2677884" y="315686"/>
+              <a:ext cx="6313715" cy="286066"/>
+            </a:xfrm>
+            <a:prstGeom prst="rect">
+              <a:avLst/>
+            </a:prstGeom>
+            <a:solidFill>
+              <a:schemeClr val="accent6"/>
+            </a:solidFill>
+            <a:ln>
+              <a:solidFill>
+                <a:schemeClr val="accent6">
+                  <a:lumMod val="75000"/>
+                </a:schemeClr>
+              </a:solidFill>
+            </a:ln>
+          </p:spPr>
+          <p:style>
+            <a:lnRef idx="2">
+              <a:schemeClr val="accent1">
+                <a:shade val="15000"/>
+              </a:schemeClr>
+            </a:lnRef>
+            <a:fillRef idx="1">
+              <a:schemeClr val="accent1"/>
+            </a:fillRef>
+            <a:effectRef idx="0">
+              <a:schemeClr val="accent1"/>
+            </a:effectRef>
+            <a:fontRef idx="minor">
+              <a:schemeClr val="lt1"/>
+            </a:fontRef>
+          </p:style>
+          <p:txBody>
+            <a:bodyPr rtlCol="0" anchor="ctr"/>
+            <a:lstStyle/>
+            <a:p>
+              <a:pPr algn="ctr"/>
+              <a:endParaRPr lang="en-GB"/>
+            </a:p>
+          </p:txBody>
+        </p:sp>
+      </p:grpSp>
+      <p:sp>
+        <p:nvSpPr>
+          <p:cNvPr id="5" name="TextBox 4">
+            <a:extLst>
+              <a:ext uri="{FF2B5EF4-FFF2-40B4-BE49-F238E27FC236}">
+                <a16:creationId xmlns:a16="http://schemas.microsoft.com/office/drawing/2014/main" id="{5ACEF9F2-F589-BA2B-C150-3E762816CEC7}"/>
+              </a:ext>
+            </a:extLst>
+          </p:cNvPr>
+          <p:cNvSpPr txBox="1"/>
+          <p:nvPr/>
+        </p:nvSpPr>
+        <p:spPr>
+          <a:xfrm>
+            <a:off x="3779092" y="494652"/>
+            <a:ext cx="2257168" cy="276999"/>
+          </a:xfrm>
+          <a:prstGeom prst="rect">
+            <a:avLst/>
+          </a:prstGeom>
+          <a:noFill/>
+        </p:spPr>
+        <p:txBody>
+          <a:bodyPr wrap="square" rtlCol="0">
+            <a:spAutoFit/>
+          </a:bodyPr>
+          <a:lstStyle/>
+          <a:p>
+            <a:pPr algn="ctr"/>
+            <a:r>
+              <a:rPr lang="en-GB" sz="1200" dirty="0">
+                <a:latin typeface="Helvetica" pitchFamily="2" charset="0"/>
+              </a:rPr>
+              <a:t>Data Acquisition</a:t>
+            </a:r>
+          </a:p>
+        </p:txBody>
+      </p:sp>
+      <p:graphicFrame>
+        <p:nvGraphicFramePr>
+          <p:cNvPr id="7" name="Table 6">
+            <a:extLst>
+              <a:ext uri="{FF2B5EF4-FFF2-40B4-BE49-F238E27FC236}">
+                <a16:creationId xmlns:a16="http://schemas.microsoft.com/office/drawing/2014/main" id="{334D00C0-DF42-6E47-CE10-878275FB2870}"/>
+              </a:ext>
+            </a:extLst>
+          </p:cNvPr>
+          <p:cNvGraphicFramePr>
+            <a:graphicFrameLocks noGrp="1"/>
+          </p:cNvGraphicFramePr>
+          <p:nvPr/>
+        </p:nvGraphicFramePr>
+        <p:xfrm>
+          <a:off x="2459665" y="814498"/>
+          <a:ext cx="4896022" cy="548640"/>
+        </p:xfrm>
+        <a:graphic>
+          <a:graphicData uri="http://schemas.openxmlformats.org/drawingml/2006/table">
+            <a:tbl>
+              <a:tblPr firstRow="1" bandRow="1">
+                <a:tableStyleId>{5C22544A-7EE6-4342-B048-85BDC9FD1C3A}</a:tableStyleId>
+              </a:tblPr>
+              <a:tblGrid>
+                <a:gridCol w="2447230">
+                  <a:extLst>
+                    <a:ext uri="{9D8B030D-6E8A-4147-A177-3AD203B41FA5}">
+                      <a16:colId xmlns:a16="http://schemas.microsoft.com/office/drawing/2014/main" val="3501301636"/>
+                    </a:ext>
+                  </a:extLst>
+                </a:gridCol>
+                <a:gridCol w="2448792">
+                  <a:extLst>
+                    <a:ext uri="{9D8B030D-6E8A-4147-A177-3AD203B41FA5}">
+                      <a16:colId xmlns:a16="http://schemas.microsoft.com/office/drawing/2014/main" val="2299007356"/>
+                    </a:ext>
+                  </a:extLst>
+                </a:gridCol>
+              </a:tblGrid>
+              <a:tr h="178259">
+                <a:tc>
+                  <a:txBody>
+                    <a:bodyPr/>
+                    <a:lstStyle/>
+                    <a:p>
+                      <a:pPr marL="171450" indent="-171450">
+                        <a:buFont typeface="Arial" panose="020B0604020202020204" pitchFamily="34" charset="0"/>
+                        <a:buChar char="•"/>
+                      </a:pPr>
+                      <a:r>
+                        <a:rPr lang="en-GB" sz="1200" b="0" dirty="0">
+                          <a:solidFill>
+                            <a:schemeClr val="tx1"/>
+                          </a:solidFill>
+                          <a:latin typeface="Helvetica Neue" panose="02000503000000020004" pitchFamily="2" charset="0"/>
+                          <a:ea typeface="Helvetica Neue" panose="02000503000000020004" pitchFamily="2" charset="0"/>
+                          <a:cs typeface="Helvetica Neue" panose="02000503000000020004" pitchFamily="2" charset="0"/>
+                        </a:rPr>
+                        <a:t>Core drilling </a:t>
+                      </a:r>
+                    </a:p>
+                  </a:txBody>
+                  <a:tcPr anchor="ctr">
+                    <a:lnL w="12700" cap="flat" cmpd="sng" algn="ctr">
+                      <a:noFill/>
+                      <a:prstDash val="solid"/>
+                      <a:round/>
+                      <a:headEnd type="none" w="med" len="med"/>
+                      <a:tailEnd type="none" w="med" len="med"/>
+                    </a:lnL>
+                    <a:lnR w="12700" cap="flat" cmpd="sng" algn="ctr">
+                      <a:noFill/>
+                      <a:prstDash val="solid"/>
+                      <a:round/>
+                      <a:headEnd type="none" w="med" len="med"/>
+                      <a:tailEnd type="none" w="med" len="med"/>
+                    </a:lnR>
+                    <a:lnT w="12700" cap="flat" cmpd="sng" algn="ctr">
+                      <a:noFill/>
+                      <a:prstDash val="solid"/>
+                      <a:round/>
+                      <a:headEnd type="none" w="med" len="med"/>
+                      <a:tailEnd type="none" w="med" len="med"/>
+                    </a:lnT>
+                    <a:lnB w="12700" cap="flat" cmpd="sng" algn="ctr">
+                      <a:noFill/>
+                      <a:prstDash val="solid"/>
+                      <a:round/>
+                      <a:headEnd type="none" w="med" len="med"/>
+                      <a:tailEnd type="none" w="med" len="med"/>
+                    </a:lnB>
+                    <a:lnTlToBr w="12700" cmpd="sng">
+                      <a:noFill/>
+                      <a:prstDash val="solid"/>
+                    </a:lnTlToBr>
+                    <a:lnBlToTr w="12700" cmpd="sng">
+                      <a:noFill/>
+                      <a:prstDash val="solid"/>
+                    </a:lnBlToTr>
+                    <a:noFill/>
+                  </a:tcPr>
+                </a:tc>
+                <a:tc>
+                  <a:txBody>
+                    <a:bodyPr/>
+                    <a:lstStyle/>
+                    <a:p>
+                      <a:pPr marL="171450" indent="-171450">
+                        <a:buFont typeface="Arial" panose="020B0604020202020204" pitchFamily="34" charset="0"/>
+                        <a:buChar char="•"/>
+                      </a:pPr>
+                      <a:r>
+                        <a:rPr lang="en-GB" sz="1200" b="0" dirty="0">
+                          <a:solidFill>
+                            <a:schemeClr val="tx1"/>
+                          </a:solidFill>
+                          <a:latin typeface="Helvetica Neue" panose="02000503000000020004" pitchFamily="2" charset="0"/>
+                          <a:ea typeface="Helvetica Neue" panose="02000503000000020004" pitchFamily="2" charset="0"/>
+                          <a:cs typeface="Helvetica Neue" panose="02000503000000020004" pitchFamily="2" charset="0"/>
+                        </a:rPr>
+                        <a:t>Core logging and digitising </a:t>
+                      </a:r>
+                    </a:p>
+                  </a:txBody>
+                  <a:tcPr anchor="ctr">
+                    <a:lnL w="12700" cap="flat" cmpd="sng" algn="ctr">
+                      <a:noFill/>
+                      <a:prstDash val="solid"/>
+                      <a:round/>
+                      <a:headEnd type="none" w="med" len="med"/>
+                      <a:tailEnd type="none" w="med" len="med"/>
+                    </a:lnL>
+                    <a:lnR w="12700" cap="flat" cmpd="sng" algn="ctr">
+                      <a:noFill/>
+                      <a:prstDash val="solid"/>
+                      <a:round/>
+                      <a:headEnd type="none" w="med" len="med"/>
+                      <a:tailEnd type="none" w="med" len="med"/>
+                    </a:lnR>
+                    <a:lnT w="12700" cap="flat" cmpd="sng" algn="ctr">
+                      <a:noFill/>
+                      <a:prstDash val="solid"/>
+                      <a:round/>
+                      <a:headEnd type="none" w="med" len="med"/>
+                      <a:tailEnd type="none" w="med" len="med"/>
+                    </a:lnT>
+                    <a:lnB w="12700" cap="flat" cmpd="sng" algn="ctr">
+                      <a:noFill/>
+                      <a:prstDash val="solid"/>
+                      <a:round/>
+                      <a:headEnd type="none" w="med" len="med"/>
+                      <a:tailEnd type="none" w="med" len="med"/>
+                    </a:lnB>
+                    <a:lnTlToBr w="12700" cmpd="sng">
+                      <a:noFill/>
+                      <a:prstDash val="solid"/>
+                    </a:lnTlToBr>
+                    <a:lnBlToTr w="12700" cmpd="sng">
+                      <a:noFill/>
+                      <a:prstDash val="solid"/>
+                    </a:lnBlToTr>
+                    <a:noFill/>
+                  </a:tcPr>
+                </a:tc>
+                <a:extLst>
+                  <a:ext uri="{0D108BD9-81ED-4DB2-BD59-A6C34878D82A}">
+                    <a16:rowId xmlns:a16="http://schemas.microsoft.com/office/drawing/2014/main" val="494886275"/>
+                  </a:ext>
+                </a:extLst>
+              </a:tr>
+              <a:tr h="145170">
+                <a:tc>
+                  <a:txBody>
+                    <a:bodyPr/>
+                    <a:lstStyle/>
+                    <a:p>
+                      <a:pPr marL="171450" indent="-171450">
+                        <a:buFont typeface="Arial" panose="020B0604020202020204" pitchFamily="34" charset="0"/>
+                        <a:buChar char="•"/>
+                      </a:pPr>
+                      <a:r>
+                        <a:rPr lang="en-GB" sz="1200" b="0" dirty="0">
+                          <a:solidFill>
+                            <a:schemeClr val="tx1"/>
+                          </a:solidFill>
+                          <a:latin typeface="Helvetica Neue" panose="02000503000000020004" pitchFamily="2" charset="0"/>
+                          <a:ea typeface="Helvetica Neue" panose="02000503000000020004" pitchFamily="2" charset="0"/>
+                          <a:cs typeface="Helvetica Neue" panose="02000503000000020004" pitchFamily="2" charset="0"/>
+                        </a:rPr>
+                        <a:t>Core scanning</a:t>
+                      </a:r>
+                    </a:p>
+                  </a:txBody>
+                  <a:tcPr anchor="ctr">
+                    <a:lnL w="12700" cap="flat" cmpd="sng" algn="ctr">
+                      <a:noFill/>
+                      <a:prstDash val="solid"/>
+                      <a:round/>
+                      <a:headEnd type="none" w="med" len="med"/>
+                      <a:tailEnd type="none" w="med" len="med"/>
+                    </a:lnL>
+                    <a:lnR w="12700" cap="flat" cmpd="sng" algn="ctr">
+                      <a:noFill/>
+                      <a:prstDash val="solid"/>
+                      <a:round/>
+                      <a:headEnd type="none" w="med" len="med"/>
+                      <a:tailEnd type="none" w="med" len="med"/>
+                    </a:lnR>
+                    <a:lnT w="12700" cap="flat" cmpd="sng" algn="ctr">
+                      <a:noFill/>
+                      <a:prstDash val="solid"/>
+                      <a:round/>
+                      <a:headEnd type="none" w="med" len="med"/>
+                      <a:tailEnd type="none" w="med" len="med"/>
+                    </a:lnT>
+                    <a:lnB w="12700" cap="flat" cmpd="sng" algn="ctr">
+                      <a:noFill/>
+                      <a:prstDash val="solid"/>
+                      <a:round/>
+                      <a:headEnd type="none" w="med" len="med"/>
+                      <a:tailEnd type="none" w="med" len="med"/>
+                    </a:lnB>
+                    <a:lnTlToBr w="12700" cmpd="sng">
+                      <a:noFill/>
+                      <a:prstDash val="solid"/>
+                    </a:lnTlToBr>
+                    <a:lnBlToTr w="12700" cmpd="sng">
+                      <a:noFill/>
+                      <a:prstDash val="solid"/>
+                    </a:lnBlToTr>
+                    <a:noFill/>
+                  </a:tcPr>
+                </a:tc>
+                <a:tc>
+                  <a:txBody>
+                    <a:bodyPr/>
+                    <a:lstStyle/>
+                    <a:p>
+                      <a:pPr marL="171450" indent="-171450">
+                        <a:buFont typeface="Arial" panose="020B0604020202020204" pitchFamily="34" charset="0"/>
+                        <a:buChar char="•"/>
+                      </a:pPr>
+                      <a:r>
+                        <a:rPr lang="en-GB" sz="1200" b="0" dirty="0">
+                          <a:solidFill>
+                            <a:schemeClr val="tx1"/>
+                          </a:solidFill>
+                          <a:latin typeface="Helvetica Neue" panose="02000503000000020004" pitchFamily="2" charset="0"/>
+                          <a:ea typeface="Helvetica Neue" panose="02000503000000020004" pitchFamily="2" charset="0"/>
+                          <a:cs typeface="Helvetica Neue" panose="02000503000000020004" pitchFamily="2" charset="0"/>
+                        </a:rPr>
+                        <a:t>Visual classification </a:t>
+                      </a:r>
+                    </a:p>
+                  </a:txBody>
+                  <a:tcPr anchor="ctr">
+                    <a:lnL w="12700" cap="flat" cmpd="sng" algn="ctr">
+                      <a:noFill/>
+                      <a:prstDash val="solid"/>
+                      <a:round/>
+                      <a:headEnd type="none" w="med" len="med"/>
+                      <a:tailEnd type="none" w="med" len="med"/>
+                    </a:lnL>
+                    <a:lnR w="12700" cap="flat" cmpd="sng" algn="ctr">
+                      <a:noFill/>
+                      <a:prstDash val="solid"/>
+                      <a:round/>
+                      <a:headEnd type="none" w="med" len="med"/>
+                      <a:tailEnd type="none" w="med" len="med"/>
+                    </a:lnR>
+                    <a:lnT w="12700" cap="flat" cmpd="sng" algn="ctr">
+                      <a:noFill/>
+                      <a:prstDash val="solid"/>
+                      <a:round/>
+                      <a:headEnd type="none" w="med" len="med"/>
+                      <a:tailEnd type="none" w="med" len="med"/>
+                    </a:lnT>
+                    <a:lnB w="12700" cap="flat" cmpd="sng" algn="ctr">
+                      <a:noFill/>
+                      <a:prstDash val="solid"/>
+                      <a:round/>
+                      <a:headEnd type="none" w="med" len="med"/>
+                      <a:tailEnd type="none" w="med" len="med"/>
+                    </a:lnB>
+                    <a:lnTlToBr w="12700" cmpd="sng">
+                      <a:noFill/>
+                      <a:prstDash val="solid"/>
+                    </a:lnTlToBr>
+                    <a:lnBlToTr w="12700" cmpd="sng">
+                      <a:noFill/>
+                      <a:prstDash val="solid"/>
+                    </a:lnBlToTr>
+                    <a:noFill/>
+                  </a:tcPr>
+                </a:tc>
+                <a:extLst>
+                  <a:ext uri="{0D108BD9-81ED-4DB2-BD59-A6C34878D82A}">
+                    <a16:rowId xmlns:a16="http://schemas.microsoft.com/office/drawing/2014/main" val="975625563"/>
+                  </a:ext>
+                </a:extLst>
+              </a:tr>
+            </a:tbl>
+          </a:graphicData>
+        </a:graphic>
+      </p:graphicFrame>
+      <p:grpSp>
+        <p:nvGrpSpPr>
+          <p:cNvPr id="89" name="Group 88">
+            <a:extLst>
+              <a:ext uri="{FF2B5EF4-FFF2-40B4-BE49-F238E27FC236}">
+                <a16:creationId xmlns:a16="http://schemas.microsoft.com/office/drawing/2014/main" id="{B0663277-01D1-49C3-B826-CD917FAE072E}"/>
+              </a:ext>
+            </a:extLst>
+          </p:cNvPr>
+          <p:cNvGrpSpPr/>
+          <p:nvPr/>
+        </p:nvGrpSpPr>
+        <p:grpSpPr>
+          <a:xfrm>
+            <a:off x="3329594" y="1936785"/>
+            <a:ext cx="3073400" cy="348343"/>
+            <a:chOff x="2044181" y="1926616"/>
+            <a:chExt cx="3073400" cy="348343"/>
+          </a:xfrm>
+          <a:solidFill>
+            <a:schemeClr val="accent1">
+              <a:lumMod val="40000"/>
+              <a:lumOff val="60000"/>
+            </a:schemeClr>
+          </a:solidFill>
+        </p:grpSpPr>
+        <p:sp>
+          <p:nvSpPr>
+            <p:cNvPr id="3" name="Data 2">
+              <a:extLst>
+                <a:ext uri="{FF2B5EF4-FFF2-40B4-BE49-F238E27FC236}">
+                  <a16:creationId xmlns:a16="http://schemas.microsoft.com/office/drawing/2014/main" id="{AB8C059B-E0DA-0456-940E-B1CB0130D6A9}"/>
+                </a:ext>
+              </a:extLst>
+            </p:cNvPr>
+            <p:cNvSpPr/>
+            <p:nvPr/>
+          </p:nvSpPr>
+          <p:spPr>
+            <a:xfrm>
+              <a:off x="2044181" y="1926616"/>
+              <a:ext cx="3073400" cy="348343"/>
+            </a:xfrm>
+            <a:prstGeom prst="flowChartInputOutput">
+              <a:avLst/>
+            </a:prstGeom>
+            <a:grpFill/>
+            <a:ln>
+              <a:solidFill>
+                <a:schemeClr val="accent1">
+                  <a:lumMod val="50000"/>
+                </a:schemeClr>
+              </a:solidFill>
+            </a:ln>
+          </p:spPr>
+          <p:style>
+            <a:lnRef idx="2">
+              <a:schemeClr val="accent1">
+                <a:shade val="15000"/>
+              </a:schemeClr>
+            </a:lnRef>
+            <a:fillRef idx="1">
+              <a:schemeClr val="accent1"/>
+            </a:fillRef>
+            <a:effectRef idx="0">
+              <a:schemeClr val="accent1"/>
+            </a:effectRef>
+            <a:fontRef idx="minor">
+              <a:schemeClr val="lt1"/>
+            </a:fontRef>
+          </p:style>
+          <p:txBody>
+            <a:bodyPr rtlCol="0" anchor="ctr"/>
+            <a:lstStyle/>
+            <a:p>
+              <a:pPr algn="ctr"/>
+              <a:endParaRPr lang="en-GB">
+                <a:solidFill>
+                  <a:schemeClr val="accent1">
+                    <a:lumMod val="60000"/>
+                    <a:lumOff val="40000"/>
+                  </a:schemeClr>
+                </a:solidFill>
+              </a:endParaRPr>
+            </a:p>
+          </p:txBody>
+        </p:sp>
+        <p:sp>
+          <p:nvSpPr>
+            <p:cNvPr id="6" name="TextBox 5">
+              <a:extLst>
+                <a:ext uri="{FF2B5EF4-FFF2-40B4-BE49-F238E27FC236}">
+                  <a16:creationId xmlns:a16="http://schemas.microsoft.com/office/drawing/2014/main" id="{3E6897FE-C0CC-D5BC-9F75-3119046E66D5}"/>
+                </a:ext>
+              </a:extLst>
+            </p:cNvPr>
+            <p:cNvSpPr txBox="1"/>
+            <p:nvPr/>
+          </p:nvSpPr>
+          <p:spPr>
+            <a:xfrm>
+              <a:off x="2452297" y="1964337"/>
+              <a:ext cx="2257168" cy="276999"/>
+            </a:xfrm>
+            <a:prstGeom prst="rect">
+              <a:avLst/>
+            </a:prstGeom>
+            <a:noFill/>
+            <a:ln>
+              <a:noFill/>
+            </a:ln>
+          </p:spPr>
+          <p:txBody>
+            <a:bodyPr wrap="square" rtlCol="0">
+              <a:spAutoFit/>
+            </a:bodyPr>
+            <a:lstStyle/>
+            <a:p>
+              <a:pPr algn="ctr"/>
+              <a:r>
+                <a:rPr lang="en-GB" sz="1200" dirty="0">
+                  <a:latin typeface="Helvetica" pitchFamily="2" charset="0"/>
+                </a:rPr>
+                <a:t>Core section images</a:t>
+              </a:r>
+            </a:p>
+          </p:txBody>
+        </p:sp>
+      </p:grpSp>
+      <p:grpSp>
+        <p:nvGrpSpPr>
+          <p:cNvPr id="37" name="Group 36">
+            <a:extLst>
+              <a:ext uri="{FF2B5EF4-FFF2-40B4-BE49-F238E27FC236}">
+                <a16:creationId xmlns:a16="http://schemas.microsoft.com/office/drawing/2014/main" id="{DA91638C-4C5C-C187-B140-3A2581897263}"/>
+              </a:ext>
+            </a:extLst>
+          </p:cNvPr>
+          <p:cNvGrpSpPr/>
+          <p:nvPr/>
+        </p:nvGrpSpPr>
+        <p:grpSpPr>
+          <a:xfrm>
+            <a:off x="3350317" y="5007575"/>
+            <a:ext cx="2989111" cy="1533541"/>
+            <a:chOff x="2677884" y="315686"/>
+            <a:chExt cx="6313715" cy="1533541"/>
+          </a:xfrm>
+        </p:grpSpPr>
+        <p:sp>
+          <p:nvSpPr>
+            <p:cNvPr id="38" name="Down Arrow Callout 37">
+              <a:extLst>
+                <a:ext uri="{FF2B5EF4-FFF2-40B4-BE49-F238E27FC236}">
+                  <a16:creationId xmlns:a16="http://schemas.microsoft.com/office/drawing/2014/main" id="{05FE7BA0-635A-9084-5DC6-45CE019D1D85}"/>
+                </a:ext>
+              </a:extLst>
+            </p:cNvPr>
+            <p:cNvSpPr/>
+            <p:nvPr/>
+          </p:nvSpPr>
+          <p:spPr>
+            <a:xfrm>
+              <a:off x="2677884" y="600890"/>
+              <a:ext cx="6313715" cy="1248337"/>
+            </a:xfrm>
+            <a:prstGeom prst="downArrowCallout">
+              <a:avLst>
+                <a:gd name="adj1" fmla="val 132914"/>
+                <a:gd name="adj2" fmla="val 102698"/>
+                <a:gd name="adj3" fmla="val 25000"/>
+                <a:gd name="adj4" fmla="val 64977"/>
+              </a:avLst>
+            </a:prstGeom>
+            <a:solidFill>
+              <a:schemeClr val="accent6"/>
+            </a:solidFill>
+            <a:ln>
+              <a:solidFill>
+                <a:schemeClr val="accent6">
+                  <a:lumMod val="75000"/>
+                </a:schemeClr>
+              </a:solidFill>
+            </a:ln>
+          </p:spPr>
+          <p:style>
+            <a:lnRef idx="2">
+              <a:schemeClr val="accent1">
+                <a:shade val="15000"/>
+              </a:schemeClr>
+            </a:lnRef>
+            <a:fillRef idx="1">
+              <a:schemeClr val="accent1"/>
+            </a:fillRef>
+            <a:effectRef idx="0">
+              <a:schemeClr val="accent1"/>
+            </a:effectRef>
+            <a:fontRef idx="minor">
+              <a:schemeClr val="lt1"/>
+            </a:fontRef>
+          </p:style>
+          <p:txBody>
+            <a:bodyPr rtlCol="0" anchor="ctr"/>
+            <a:lstStyle/>
+            <a:p>
+              <a:pPr algn="ctr"/>
+              <a:endParaRPr lang="en-GB">
+                <a:solidFill>
+                  <a:sysClr val="windowText" lastClr="000000"/>
+                </a:solidFill>
+              </a:endParaRPr>
+            </a:p>
+          </p:txBody>
+        </p:sp>
+        <p:sp>
+          <p:nvSpPr>
+            <p:cNvPr id="39" name="Rectangle 38">
+              <a:extLst>
+                <a:ext uri="{FF2B5EF4-FFF2-40B4-BE49-F238E27FC236}">
+                  <a16:creationId xmlns:a16="http://schemas.microsoft.com/office/drawing/2014/main" id="{458EF9C5-2702-2443-9FCB-785EE68AB461}"/>
+                </a:ext>
+              </a:extLst>
+            </p:cNvPr>
+            <p:cNvSpPr/>
+            <p:nvPr/>
+          </p:nvSpPr>
+          <p:spPr>
+            <a:xfrm>
+              <a:off x="2677884" y="315686"/>
+              <a:ext cx="6313715" cy="286066"/>
+            </a:xfrm>
+            <a:prstGeom prst="rect">
+              <a:avLst/>
+            </a:prstGeom>
+            <a:solidFill>
+              <a:schemeClr val="accent6"/>
+            </a:solidFill>
+            <a:ln>
+              <a:solidFill>
+                <a:schemeClr val="accent6">
+                  <a:lumMod val="75000"/>
+                </a:schemeClr>
+              </a:solidFill>
+            </a:ln>
+          </p:spPr>
+          <p:style>
+            <a:lnRef idx="2">
+              <a:schemeClr val="accent1">
+                <a:shade val="15000"/>
+              </a:schemeClr>
+            </a:lnRef>
+            <a:fillRef idx="1">
+              <a:schemeClr val="accent1"/>
+            </a:fillRef>
+            <a:effectRef idx="0">
+              <a:schemeClr val="accent1"/>
+            </a:effectRef>
+            <a:fontRef idx="minor">
+              <a:schemeClr val="lt1"/>
+            </a:fontRef>
+          </p:style>
+          <p:txBody>
+            <a:bodyPr rtlCol="0" anchor="ctr"/>
+            <a:lstStyle/>
+            <a:p>
+              <a:pPr algn="ctr"/>
+              <a:endParaRPr lang="en-GB">
+                <a:solidFill>
+                  <a:sysClr val="windowText" lastClr="000000"/>
+                </a:solidFill>
+              </a:endParaRPr>
+            </a:p>
+          </p:txBody>
+        </p:sp>
+      </p:grpSp>
+      <p:sp>
+        <p:nvSpPr>
+          <p:cNvPr id="40" name="TextBox 39">
+            <a:extLst>
+              <a:ext uri="{FF2B5EF4-FFF2-40B4-BE49-F238E27FC236}">
+                <a16:creationId xmlns:a16="http://schemas.microsoft.com/office/drawing/2014/main" id="{A349948F-9F76-852B-1DDE-E174DDFB2800}"/>
+              </a:ext>
+            </a:extLst>
+          </p:cNvPr>
+          <p:cNvSpPr txBox="1"/>
+          <p:nvPr/>
+        </p:nvSpPr>
+        <p:spPr>
+          <a:xfrm>
+            <a:off x="3350316" y="5015780"/>
+            <a:ext cx="2989112" cy="276999"/>
+          </a:xfrm>
+          <a:prstGeom prst="rect">
+            <a:avLst/>
+          </a:prstGeom>
+          <a:noFill/>
+        </p:spPr>
+        <p:txBody>
+          <a:bodyPr wrap="square" rtlCol="0">
+            <a:spAutoFit/>
+          </a:bodyPr>
+          <a:lstStyle/>
+          <a:p>
+            <a:pPr algn="ctr"/>
+            <a:r>
+              <a:rPr lang="en-GB" sz="1200">
+                <a:latin typeface="Helvetica" pitchFamily="2" charset="0"/>
+              </a:rPr>
+              <a:t>Image labelling</a:t>
+            </a:r>
+            <a:endParaRPr lang="en-GB" sz="1200" dirty="0">
+              <a:latin typeface="Helvetica" pitchFamily="2" charset="0"/>
+            </a:endParaRPr>
+          </a:p>
+        </p:txBody>
+      </p:sp>
+      <p:sp>
+        <p:nvSpPr>
+          <p:cNvPr id="41" name="TextBox 40">
+            <a:extLst>
+              <a:ext uri="{FF2B5EF4-FFF2-40B4-BE49-F238E27FC236}">
+                <a16:creationId xmlns:a16="http://schemas.microsoft.com/office/drawing/2014/main" id="{D683B527-0858-6E33-B331-D904C16C723A}"/>
+              </a:ext>
+            </a:extLst>
+          </p:cNvPr>
+          <p:cNvSpPr txBox="1"/>
+          <p:nvPr/>
+        </p:nvSpPr>
+        <p:spPr>
+          <a:xfrm>
+            <a:off x="3350317" y="5301341"/>
+            <a:ext cx="2952126" cy="1107996"/>
+          </a:xfrm>
+          <a:prstGeom prst="rect">
+            <a:avLst/>
+          </a:prstGeom>
+          <a:noFill/>
+        </p:spPr>
+        <p:txBody>
+          <a:bodyPr wrap="square" rtlCol="0">
+            <a:spAutoFit/>
+          </a:bodyPr>
+          <a:lstStyle/>
+          <a:p>
+            <a:pPr algn="ctr"/>
+            <a:r>
+              <a:rPr lang="en-GB" sz="1200" dirty="0" err="1">
+                <a:latin typeface="Helvetica" pitchFamily="2" charset="0"/>
+              </a:rPr>
+              <a:t>Labeling</a:t>
+            </a:r>
+            <a:r>
+              <a:rPr lang="en-GB" sz="1200" dirty="0">
+                <a:latin typeface="Helvetica" pitchFamily="2" charset="0"/>
+              </a:rPr>
+              <a:t> of image sections according to four classes: </a:t>
+            </a:r>
+          </a:p>
+          <a:p>
+            <a:endParaRPr lang="en-GB" sz="600" dirty="0">
+              <a:latin typeface="Helvetica" pitchFamily="2" charset="0"/>
+            </a:endParaRPr>
+          </a:p>
+          <a:p>
+            <a:pPr algn="ctr"/>
+            <a:r>
+              <a:rPr lang="en-GB" sz="1200" dirty="0">
+                <a:latin typeface="Helvetica" pitchFamily="2" charset="0"/>
+              </a:rPr>
+              <a:t>(D) </a:t>
+            </a:r>
+            <a:r>
+              <a:rPr lang="en-GB" sz="1200" dirty="0" err="1">
+                <a:latin typeface="Helvetica" pitchFamily="2" charset="0"/>
+              </a:rPr>
+              <a:t>Diamict</a:t>
+            </a:r>
+            <a:r>
+              <a:rPr lang="en-GB" sz="1200" dirty="0">
+                <a:latin typeface="Helvetica" pitchFamily="2" charset="0"/>
+              </a:rPr>
+              <a:t>, (G) Gravel (S) Sand, (F) Fines</a:t>
+            </a:r>
+          </a:p>
+          <a:p>
+            <a:endParaRPr lang="en-GB" sz="1200" dirty="0">
+              <a:latin typeface="Helvetica" pitchFamily="2" charset="0"/>
+            </a:endParaRPr>
+          </a:p>
+        </p:txBody>
+      </p:sp>
+      <p:grpSp>
+        <p:nvGrpSpPr>
+          <p:cNvPr id="91" name="Group 90">
+            <a:extLst>
+              <a:ext uri="{FF2B5EF4-FFF2-40B4-BE49-F238E27FC236}">
+                <a16:creationId xmlns:a16="http://schemas.microsoft.com/office/drawing/2014/main" id="{8993C3CC-A454-EA9F-8808-3541A5A9CD07}"/>
+              </a:ext>
+            </a:extLst>
+          </p:cNvPr>
+          <p:cNvGrpSpPr/>
+          <p:nvPr/>
+        </p:nvGrpSpPr>
+        <p:grpSpPr>
+          <a:xfrm>
+            <a:off x="3493328" y="4457410"/>
+            <a:ext cx="2809115" cy="348343"/>
+            <a:chOff x="2044181" y="5096212"/>
+            <a:chExt cx="3073400" cy="348343"/>
+          </a:xfrm>
+        </p:grpSpPr>
+        <p:sp>
+          <p:nvSpPr>
+            <p:cNvPr id="42" name="Data 41">
+              <a:extLst>
+                <a:ext uri="{FF2B5EF4-FFF2-40B4-BE49-F238E27FC236}">
+                  <a16:creationId xmlns:a16="http://schemas.microsoft.com/office/drawing/2014/main" id="{790ADD28-7423-E1B6-F0AC-C4CC9E696D66}"/>
+                </a:ext>
+              </a:extLst>
+            </p:cNvPr>
+            <p:cNvSpPr/>
+            <p:nvPr/>
+          </p:nvSpPr>
+          <p:spPr>
+            <a:xfrm>
+              <a:off x="2044181" y="5096212"/>
+              <a:ext cx="3073400" cy="348343"/>
+            </a:xfrm>
+            <a:prstGeom prst="flowChartInputOutput">
+              <a:avLst/>
+            </a:prstGeom>
+            <a:solidFill>
+              <a:schemeClr val="accent1">
+                <a:lumMod val="40000"/>
+                <a:lumOff val="60000"/>
+              </a:schemeClr>
+            </a:solidFill>
+            <a:ln>
+              <a:solidFill>
+                <a:schemeClr val="accent1">
+                  <a:lumMod val="50000"/>
+                </a:schemeClr>
+              </a:solidFill>
+            </a:ln>
+          </p:spPr>
+          <p:style>
+            <a:lnRef idx="2">
+              <a:schemeClr val="accent1">
+                <a:shade val="15000"/>
+              </a:schemeClr>
+            </a:lnRef>
+            <a:fillRef idx="1">
+              <a:schemeClr val="accent1"/>
+            </a:fillRef>
+            <a:effectRef idx="0">
+              <a:schemeClr val="accent1"/>
+            </a:effectRef>
+            <a:fontRef idx="minor">
+              <a:schemeClr val="lt1"/>
+            </a:fontRef>
+          </p:style>
+          <p:txBody>
+            <a:bodyPr rtlCol="0" anchor="ctr"/>
+            <a:lstStyle/>
+            <a:p>
+              <a:pPr algn="ctr"/>
+              <a:endParaRPr lang="en-GB">
+                <a:solidFill>
+                  <a:schemeClr val="accent1">
+                    <a:lumMod val="60000"/>
+                    <a:lumOff val="40000"/>
+                  </a:schemeClr>
+                </a:solidFill>
+              </a:endParaRPr>
+            </a:p>
+          </p:txBody>
+        </p:sp>
+        <p:sp>
+          <p:nvSpPr>
+            <p:cNvPr id="43" name="TextBox 42">
+              <a:extLst>
+                <a:ext uri="{FF2B5EF4-FFF2-40B4-BE49-F238E27FC236}">
+                  <a16:creationId xmlns:a16="http://schemas.microsoft.com/office/drawing/2014/main" id="{FED46370-FEC2-61E3-0C64-32E98420B1DC}"/>
+                </a:ext>
+              </a:extLst>
+            </p:cNvPr>
+            <p:cNvSpPr txBox="1"/>
+            <p:nvPr/>
+          </p:nvSpPr>
+          <p:spPr>
+            <a:xfrm>
+              <a:off x="2452297" y="5133933"/>
+              <a:ext cx="2257168" cy="276999"/>
+            </a:xfrm>
+            <a:prstGeom prst="rect">
+              <a:avLst/>
+            </a:prstGeom>
+            <a:noFill/>
+          </p:spPr>
+          <p:txBody>
+            <a:bodyPr wrap="square" rtlCol="0">
+              <a:spAutoFit/>
+            </a:bodyPr>
+            <a:lstStyle/>
+            <a:p>
+              <a:pPr algn="ctr"/>
+              <a:r>
+                <a:rPr lang="en-GB" sz="1200" dirty="0">
+                  <a:latin typeface="Helvetica" pitchFamily="2" charset="0"/>
+                </a:rPr>
+                <a:t>Subset of core images</a:t>
+              </a:r>
+            </a:p>
+          </p:txBody>
+        </p:sp>
+      </p:grpSp>
+      <p:sp>
+        <p:nvSpPr>
+          <p:cNvPr id="46" name="Down Arrow 45">
+            <a:extLst>
+              <a:ext uri="{FF2B5EF4-FFF2-40B4-BE49-F238E27FC236}">
+                <a16:creationId xmlns:a16="http://schemas.microsoft.com/office/drawing/2014/main" id="{6F8D0177-E0A0-DCAE-AF1B-A67BE7EFEF0C}"/>
+              </a:ext>
+            </a:extLst>
+          </p:cNvPr>
+          <p:cNvSpPr/>
+          <p:nvPr/>
+        </p:nvSpPr>
+        <p:spPr>
+          <a:xfrm>
+            <a:off x="4301651" y="7416725"/>
+            <a:ext cx="971485" cy="348343"/>
+          </a:xfrm>
+          <a:prstGeom prst="downArrow">
+            <a:avLst/>
+          </a:prstGeom>
+          <a:solidFill>
+            <a:schemeClr val="accent1">
+              <a:lumMod val="40000"/>
+              <a:lumOff val="60000"/>
+            </a:schemeClr>
+          </a:solidFill>
+          <a:ln>
+            <a:solidFill>
+              <a:schemeClr val="accent1">
+                <a:lumMod val="50000"/>
+              </a:schemeClr>
+            </a:solidFill>
+          </a:ln>
+        </p:spPr>
+        <p:style>
+          <a:lnRef idx="2">
+            <a:schemeClr val="accent1">
+              <a:shade val="15000"/>
+            </a:schemeClr>
+          </a:lnRef>
+          <a:fillRef idx="1">
+            <a:schemeClr val="accent1"/>
+          </a:fillRef>
+          <a:effectRef idx="0">
+            <a:schemeClr val="accent1"/>
+          </a:effectRef>
+          <a:fontRef idx="minor">
+            <a:schemeClr val="lt1"/>
+          </a:fontRef>
+        </p:style>
+        <p:txBody>
+          <a:bodyPr rtlCol="0" anchor="ctr"/>
+          <a:lstStyle/>
+          <a:p>
+            <a:pPr algn="ctr"/>
+            <a:endParaRPr lang="en-GB"/>
+          </a:p>
+        </p:txBody>
+      </p:sp>
+      <p:grpSp>
+        <p:nvGrpSpPr>
+          <p:cNvPr id="93" name="Group 92">
+            <a:extLst>
+              <a:ext uri="{FF2B5EF4-FFF2-40B4-BE49-F238E27FC236}">
+                <a16:creationId xmlns:a16="http://schemas.microsoft.com/office/drawing/2014/main" id="{D6B1ABBC-650C-EEB0-A7FE-B263344446AC}"/>
+              </a:ext>
+            </a:extLst>
+          </p:cNvPr>
+          <p:cNvGrpSpPr/>
+          <p:nvPr/>
+        </p:nvGrpSpPr>
+        <p:grpSpPr>
+          <a:xfrm>
+            <a:off x="3385056" y="6808060"/>
+            <a:ext cx="2804677" cy="348343"/>
+            <a:chOff x="2032488" y="7523831"/>
+            <a:chExt cx="3073400" cy="348343"/>
+          </a:xfrm>
+        </p:grpSpPr>
+        <p:sp>
+          <p:nvSpPr>
+            <p:cNvPr id="47" name="Data 46">
+              <a:extLst>
+                <a:ext uri="{FF2B5EF4-FFF2-40B4-BE49-F238E27FC236}">
+                  <a16:creationId xmlns:a16="http://schemas.microsoft.com/office/drawing/2014/main" id="{C437C378-AFD1-B59F-077C-5C047E9DDD1A}"/>
+                </a:ext>
+              </a:extLst>
+            </p:cNvPr>
+            <p:cNvSpPr/>
+            <p:nvPr/>
+          </p:nvSpPr>
+          <p:spPr>
+            <a:xfrm>
+              <a:off x="2032488" y="7523831"/>
+              <a:ext cx="3073400" cy="348343"/>
+            </a:xfrm>
+            <a:prstGeom prst="flowChartInputOutput">
+              <a:avLst/>
+            </a:prstGeom>
+            <a:solidFill>
+              <a:schemeClr val="accent1">
+                <a:lumMod val="40000"/>
+                <a:lumOff val="60000"/>
+              </a:schemeClr>
+            </a:solidFill>
+            <a:ln>
+              <a:solidFill>
+                <a:schemeClr val="accent1">
+                  <a:lumMod val="50000"/>
+                </a:schemeClr>
+              </a:solidFill>
+            </a:ln>
+          </p:spPr>
+          <p:style>
+            <a:lnRef idx="2">
+              <a:schemeClr val="accent1">
+                <a:shade val="15000"/>
+              </a:schemeClr>
+            </a:lnRef>
+            <a:fillRef idx="1">
+              <a:schemeClr val="accent1"/>
+            </a:fillRef>
+            <a:effectRef idx="0">
+              <a:schemeClr val="accent1"/>
+            </a:effectRef>
+            <a:fontRef idx="minor">
+              <a:schemeClr val="lt1"/>
+            </a:fontRef>
+          </p:style>
+          <p:txBody>
+            <a:bodyPr rtlCol="0" anchor="ctr"/>
+            <a:lstStyle/>
+            <a:p>
+              <a:pPr algn="ctr"/>
+              <a:endParaRPr lang="en-GB">
+                <a:solidFill>
+                  <a:schemeClr val="accent1">
+                    <a:lumMod val="60000"/>
+                    <a:lumOff val="40000"/>
+                  </a:schemeClr>
+                </a:solidFill>
+              </a:endParaRPr>
+            </a:p>
+          </p:txBody>
+        </p:sp>
+        <p:sp>
+          <p:nvSpPr>
+            <p:cNvPr id="48" name="TextBox 47">
+              <a:extLst>
+                <a:ext uri="{FF2B5EF4-FFF2-40B4-BE49-F238E27FC236}">
+                  <a16:creationId xmlns:a16="http://schemas.microsoft.com/office/drawing/2014/main" id="{3CED25A0-A044-0EC4-1E5F-325A17FB1F48}"/>
+                </a:ext>
+              </a:extLst>
+            </p:cNvPr>
+            <p:cNvSpPr txBox="1"/>
+            <p:nvPr/>
+          </p:nvSpPr>
+          <p:spPr>
+            <a:xfrm>
+              <a:off x="2440604" y="7561552"/>
+              <a:ext cx="2257168" cy="276999"/>
+            </a:xfrm>
+            <a:prstGeom prst="rect">
+              <a:avLst/>
+            </a:prstGeom>
+            <a:noFill/>
+          </p:spPr>
+          <p:txBody>
+            <a:bodyPr wrap="square" rtlCol="0">
+              <a:spAutoFit/>
+            </a:bodyPr>
+            <a:lstStyle/>
+            <a:p>
+              <a:pPr algn="ctr"/>
+              <a:r>
+                <a:rPr lang="en-GB" sz="1200" dirty="0" err="1">
+                  <a:latin typeface="Helvetica" pitchFamily="2" charset="0"/>
+                </a:rPr>
+                <a:t>Labeled</a:t>
+              </a:r>
+              <a:r>
+                <a:rPr lang="en-GB" sz="1200" dirty="0">
+                  <a:latin typeface="Helvetica" pitchFamily="2" charset="0"/>
+                </a:rPr>
+                <a:t> images</a:t>
+              </a:r>
+            </a:p>
+          </p:txBody>
+        </p:sp>
+      </p:grpSp>
+      <p:grpSp>
+        <p:nvGrpSpPr>
+          <p:cNvPr id="86" name="Group 85">
+            <a:extLst>
+              <a:ext uri="{FF2B5EF4-FFF2-40B4-BE49-F238E27FC236}">
+                <a16:creationId xmlns:a16="http://schemas.microsoft.com/office/drawing/2014/main" id="{78EA60C0-7A6F-993B-6B3F-4E4AF5412404}"/>
+              </a:ext>
+            </a:extLst>
+          </p:cNvPr>
+          <p:cNvGrpSpPr/>
+          <p:nvPr/>
+        </p:nvGrpSpPr>
+        <p:grpSpPr>
+          <a:xfrm>
+            <a:off x="3350316" y="7886044"/>
+            <a:ext cx="2952127" cy="3958590"/>
+            <a:chOff x="2677884" y="315686"/>
+            <a:chExt cx="2952127" cy="3958590"/>
+          </a:xfrm>
+        </p:grpSpPr>
+        <p:sp>
+          <p:nvSpPr>
+            <p:cNvPr id="87" name="Down Arrow Callout 86">
+              <a:extLst>
+                <a:ext uri="{FF2B5EF4-FFF2-40B4-BE49-F238E27FC236}">
+                  <a16:creationId xmlns:a16="http://schemas.microsoft.com/office/drawing/2014/main" id="{641ABF29-727D-C5D9-3439-7F9C2FD55949}"/>
+                </a:ext>
+              </a:extLst>
+            </p:cNvPr>
+            <p:cNvSpPr/>
+            <p:nvPr/>
+          </p:nvSpPr>
+          <p:spPr>
+            <a:xfrm>
+              <a:off x="2677884" y="600889"/>
+              <a:ext cx="2952127" cy="3673387"/>
+            </a:xfrm>
+            <a:prstGeom prst="downArrowCallout">
+              <a:avLst>
+                <a:gd name="adj1" fmla="val 62899"/>
+                <a:gd name="adj2" fmla="val 70198"/>
+                <a:gd name="adj3" fmla="val 11432"/>
+                <a:gd name="adj4" fmla="val 84470"/>
+              </a:avLst>
+            </a:prstGeom>
+            <a:solidFill>
+              <a:schemeClr val="accent2">
+                <a:lumMod val="60000"/>
+                <a:lumOff val="40000"/>
+              </a:schemeClr>
+            </a:solidFill>
+            <a:ln>
+              <a:solidFill>
+                <a:schemeClr val="accent2">
+                  <a:lumMod val="50000"/>
+                </a:schemeClr>
+              </a:solidFill>
+            </a:ln>
+          </p:spPr>
+          <p:style>
+            <a:lnRef idx="2">
+              <a:schemeClr val="accent1">
+                <a:shade val="15000"/>
+              </a:schemeClr>
+            </a:lnRef>
+            <a:fillRef idx="1">
+              <a:schemeClr val="accent1"/>
+            </a:fillRef>
+            <a:effectRef idx="0">
+              <a:schemeClr val="accent1"/>
+            </a:effectRef>
+            <a:fontRef idx="minor">
+              <a:schemeClr val="lt1"/>
+            </a:fontRef>
+          </p:style>
+          <p:txBody>
+            <a:bodyPr rtlCol="0" anchor="ctr"/>
+            <a:lstStyle/>
+            <a:p>
+              <a:pPr algn="ctr"/>
+              <a:endParaRPr lang="en-GB">
+                <a:solidFill>
+                  <a:sysClr val="windowText" lastClr="000000"/>
+                </a:solidFill>
+              </a:endParaRPr>
+            </a:p>
+          </p:txBody>
+        </p:sp>
+        <p:sp>
+          <p:nvSpPr>
+            <p:cNvPr id="88" name="Rectangle 87">
+              <a:extLst>
+                <a:ext uri="{FF2B5EF4-FFF2-40B4-BE49-F238E27FC236}">
+                  <a16:creationId xmlns:a16="http://schemas.microsoft.com/office/drawing/2014/main" id="{24E7A86C-8B4A-7690-1080-C3C4C356A64B}"/>
+                </a:ext>
+              </a:extLst>
+            </p:cNvPr>
+            <p:cNvSpPr/>
+            <p:nvPr/>
+          </p:nvSpPr>
+          <p:spPr>
+            <a:xfrm>
+              <a:off x="2677885" y="315686"/>
+              <a:ext cx="2952126" cy="286066"/>
+            </a:xfrm>
+            <a:prstGeom prst="rect">
+              <a:avLst/>
+            </a:prstGeom>
+            <a:solidFill>
+              <a:schemeClr val="accent6"/>
+            </a:solidFill>
+            <a:ln>
+              <a:solidFill>
+                <a:schemeClr val="accent2">
+                  <a:lumMod val="50000"/>
+                </a:schemeClr>
+              </a:solidFill>
+            </a:ln>
+          </p:spPr>
+          <p:style>
+            <a:lnRef idx="2">
+              <a:schemeClr val="accent1">
+                <a:shade val="15000"/>
+              </a:schemeClr>
+            </a:lnRef>
+            <a:fillRef idx="1">
+              <a:schemeClr val="accent1"/>
+            </a:fillRef>
+            <a:effectRef idx="0">
+              <a:schemeClr val="accent1"/>
+            </a:effectRef>
+            <a:fontRef idx="minor">
+              <a:schemeClr val="lt1"/>
+            </a:fontRef>
+          </p:style>
+          <p:txBody>
+            <a:bodyPr rtlCol="0" anchor="ctr"/>
+            <a:lstStyle/>
+            <a:p>
+              <a:pPr algn="ctr"/>
+              <a:endParaRPr lang="en-GB"/>
+            </a:p>
+          </p:txBody>
+        </p:sp>
+      </p:grpSp>
+      <p:sp>
+        <p:nvSpPr>
+          <p:cNvPr id="22" name="TextBox 21">
+            <a:extLst>
+              <a:ext uri="{FF2B5EF4-FFF2-40B4-BE49-F238E27FC236}">
+                <a16:creationId xmlns:a16="http://schemas.microsoft.com/office/drawing/2014/main" id="{28D189A8-8DB4-EF4A-AA33-8EC2706E4F28}"/>
+              </a:ext>
+            </a:extLst>
+          </p:cNvPr>
+          <p:cNvSpPr txBox="1"/>
+          <p:nvPr/>
+        </p:nvSpPr>
+        <p:spPr>
+          <a:xfrm>
+            <a:off x="3672254" y="7886890"/>
+            <a:ext cx="2257168" cy="276999"/>
+          </a:xfrm>
+          <a:prstGeom prst="rect">
+            <a:avLst/>
+          </a:prstGeom>
+          <a:noFill/>
+        </p:spPr>
+        <p:txBody>
+          <a:bodyPr wrap="square" rtlCol="0">
+            <a:spAutoFit/>
+          </a:bodyPr>
+          <a:lstStyle/>
+          <a:p>
+            <a:pPr algn="ctr"/>
+            <a:r>
+              <a:rPr lang="en-GB" sz="1200" dirty="0">
+                <a:latin typeface="Helvetica" pitchFamily="2" charset="0"/>
+              </a:rPr>
+              <a:t>Deep Learning sub-flow</a:t>
+            </a:r>
+          </a:p>
+        </p:txBody>
+      </p:sp>
+      <p:grpSp>
+        <p:nvGrpSpPr>
+          <p:cNvPr id="59" name="Group 58">
+            <a:extLst>
+              <a:ext uri="{FF2B5EF4-FFF2-40B4-BE49-F238E27FC236}">
+                <a16:creationId xmlns:a16="http://schemas.microsoft.com/office/drawing/2014/main" id="{E5896CFE-7C12-6423-CD9D-DEEDB5BBF61A}"/>
+              </a:ext>
+            </a:extLst>
+          </p:cNvPr>
+          <p:cNvGrpSpPr/>
+          <p:nvPr/>
+        </p:nvGrpSpPr>
+        <p:grpSpPr>
+          <a:xfrm>
+            <a:off x="3780705" y="8319376"/>
+            <a:ext cx="2036595" cy="431468"/>
+            <a:chOff x="2805990" y="8955850"/>
+            <a:chExt cx="4238422" cy="431468"/>
+          </a:xfrm>
+          <a:solidFill>
+            <a:srgbClr val="92D050"/>
+          </a:solidFill>
+        </p:grpSpPr>
+        <p:sp>
+          <p:nvSpPr>
+            <p:cNvPr id="56" name="Down Arrow Callout 55">
+              <a:extLst>
+                <a:ext uri="{FF2B5EF4-FFF2-40B4-BE49-F238E27FC236}">
+                  <a16:creationId xmlns:a16="http://schemas.microsoft.com/office/drawing/2014/main" id="{1729F338-DF58-A454-C569-9ECE2D3E1A2F}"/>
+                </a:ext>
+              </a:extLst>
+            </p:cNvPr>
+            <p:cNvSpPr/>
+            <p:nvPr/>
+          </p:nvSpPr>
+          <p:spPr>
+            <a:xfrm>
+              <a:off x="2805990" y="8955850"/>
+              <a:ext cx="4238422" cy="431468"/>
+            </a:xfrm>
+            <a:prstGeom prst="downArrowCallout">
+              <a:avLst>
+                <a:gd name="adj1" fmla="val 232786"/>
+                <a:gd name="adj2" fmla="val 217394"/>
+                <a:gd name="adj3" fmla="val 25000"/>
+                <a:gd name="adj4" fmla="val 64977"/>
+              </a:avLst>
+            </a:prstGeom>
+            <a:solidFill>
+              <a:schemeClr val="accent6"/>
+            </a:solidFill>
+            <a:ln>
+              <a:solidFill>
+                <a:schemeClr val="accent2">
+                  <a:lumMod val="75000"/>
+                </a:schemeClr>
+              </a:solidFill>
+            </a:ln>
+          </p:spPr>
+          <p:style>
+            <a:lnRef idx="2">
+              <a:schemeClr val="accent1">
+                <a:shade val="15000"/>
+              </a:schemeClr>
+            </a:lnRef>
+            <a:fillRef idx="1">
+              <a:schemeClr val="accent1"/>
+            </a:fillRef>
+            <a:effectRef idx="0">
+              <a:schemeClr val="accent1"/>
+            </a:effectRef>
+            <a:fontRef idx="minor">
+              <a:schemeClr val="lt1"/>
+            </a:fontRef>
+          </p:style>
+          <p:txBody>
+            <a:bodyPr rtlCol="0" anchor="ctr"/>
+            <a:lstStyle/>
+            <a:p>
+              <a:pPr algn="ctr"/>
+              <a:endParaRPr lang="en-GB" dirty="0">
+                <a:solidFill>
+                  <a:sysClr val="windowText" lastClr="000000"/>
+                </a:solidFill>
+              </a:endParaRPr>
+            </a:p>
+          </p:txBody>
+        </p:sp>
+        <p:sp>
+          <p:nvSpPr>
+            <p:cNvPr id="58" name="TextBox 57">
+              <a:extLst>
+                <a:ext uri="{FF2B5EF4-FFF2-40B4-BE49-F238E27FC236}">
+                  <a16:creationId xmlns:a16="http://schemas.microsoft.com/office/drawing/2014/main" id="{D571E192-03FB-1EA8-9954-D191D8A2D45D}"/>
+                </a:ext>
+              </a:extLst>
+            </p:cNvPr>
+            <p:cNvSpPr txBox="1"/>
+            <p:nvPr/>
+          </p:nvSpPr>
+          <p:spPr>
+            <a:xfrm>
+              <a:off x="3197901" y="8961931"/>
+              <a:ext cx="3454912" cy="276999"/>
+            </a:xfrm>
+            <a:prstGeom prst="rect">
+              <a:avLst/>
+            </a:prstGeom>
+            <a:noFill/>
+          </p:spPr>
+          <p:txBody>
+            <a:bodyPr wrap="square" rtlCol="0">
+              <a:spAutoFit/>
+            </a:bodyPr>
+            <a:lstStyle/>
+            <a:p>
+              <a:pPr algn="ctr"/>
+              <a:r>
+                <a:rPr lang="en-GB" sz="1200">
+                  <a:latin typeface="Helvetica" pitchFamily="2" charset="0"/>
+                </a:rPr>
+                <a:t>Image Segmentation</a:t>
+              </a:r>
+              <a:endParaRPr lang="en-GB" sz="1200" dirty="0">
+                <a:latin typeface="Helvetica" pitchFamily="2" charset="0"/>
+              </a:endParaRPr>
+            </a:p>
+          </p:txBody>
+        </p:sp>
+      </p:grpSp>
+      <p:grpSp>
+        <p:nvGrpSpPr>
+          <p:cNvPr id="63" name="Group 62">
+            <a:extLst>
+              <a:ext uri="{FF2B5EF4-FFF2-40B4-BE49-F238E27FC236}">
+                <a16:creationId xmlns:a16="http://schemas.microsoft.com/office/drawing/2014/main" id="{1806E3B2-91BB-3AA2-A362-CA6B2E199F05}"/>
+              </a:ext>
+            </a:extLst>
+          </p:cNvPr>
+          <p:cNvGrpSpPr/>
+          <p:nvPr/>
+        </p:nvGrpSpPr>
+        <p:grpSpPr>
+          <a:xfrm>
+            <a:off x="3780705" y="9250241"/>
+            <a:ext cx="2013251" cy="431468"/>
+            <a:chOff x="2805990" y="8955850"/>
+            <a:chExt cx="4238422" cy="431468"/>
+          </a:xfrm>
+          <a:solidFill>
+            <a:srgbClr val="92D050"/>
+          </a:solidFill>
+        </p:grpSpPr>
+        <p:sp>
+          <p:nvSpPr>
+            <p:cNvPr id="64" name="Down Arrow Callout 63">
+              <a:extLst>
+                <a:ext uri="{FF2B5EF4-FFF2-40B4-BE49-F238E27FC236}">
+                  <a16:creationId xmlns:a16="http://schemas.microsoft.com/office/drawing/2014/main" id="{0E85ED06-BF71-5297-4254-0467406890C4}"/>
+                </a:ext>
+              </a:extLst>
+            </p:cNvPr>
+            <p:cNvSpPr/>
+            <p:nvPr/>
+          </p:nvSpPr>
+          <p:spPr>
+            <a:xfrm>
+              <a:off x="2805990" y="8955850"/>
+              <a:ext cx="4238422" cy="431468"/>
+            </a:xfrm>
+            <a:prstGeom prst="downArrowCallout">
+              <a:avLst>
+                <a:gd name="adj1" fmla="val 127277"/>
+                <a:gd name="adj2" fmla="val 119161"/>
+                <a:gd name="adj3" fmla="val 25000"/>
+                <a:gd name="adj4" fmla="val 64977"/>
+              </a:avLst>
+            </a:prstGeom>
+            <a:solidFill>
+              <a:schemeClr val="accent6"/>
+            </a:solidFill>
+            <a:ln>
+              <a:solidFill>
+                <a:schemeClr val="accent2">
+                  <a:lumMod val="75000"/>
+                </a:schemeClr>
+              </a:solidFill>
+            </a:ln>
+          </p:spPr>
+          <p:style>
+            <a:lnRef idx="2">
+              <a:schemeClr val="accent1">
+                <a:shade val="15000"/>
+              </a:schemeClr>
+            </a:lnRef>
+            <a:fillRef idx="1">
+              <a:schemeClr val="accent1"/>
+            </a:fillRef>
+            <a:effectRef idx="0">
+              <a:schemeClr val="accent1"/>
+            </a:effectRef>
+            <a:fontRef idx="minor">
+              <a:schemeClr val="lt1"/>
+            </a:fontRef>
+          </p:style>
+          <p:txBody>
+            <a:bodyPr rtlCol="0" anchor="ctr"/>
+            <a:lstStyle/>
+            <a:p>
+              <a:pPr algn="ctr"/>
+              <a:endParaRPr lang="en-GB" dirty="0">
+                <a:solidFill>
+                  <a:sysClr val="windowText" lastClr="000000"/>
+                </a:solidFill>
+              </a:endParaRPr>
+            </a:p>
+          </p:txBody>
+        </p:sp>
+        <p:sp>
+          <p:nvSpPr>
+            <p:cNvPr id="65" name="TextBox 64">
+              <a:extLst>
+                <a:ext uri="{FF2B5EF4-FFF2-40B4-BE49-F238E27FC236}">
+                  <a16:creationId xmlns:a16="http://schemas.microsoft.com/office/drawing/2014/main" id="{1BB5D966-4E16-9AC7-6280-CA77A5A8294B}"/>
+                </a:ext>
+              </a:extLst>
+            </p:cNvPr>
+            <p:cNvSpPr txBox="1"/>
+            <p:nvPr/>
+          </p:nvSpPr>
+          <p:spPr>
+            <a:xfrm>
+              <a:off x="3197901" y="8961931"/>
+              <a:ext cx="3454912" cy="276999"/>
+            </a:xfrm>
+            <a:prstGeom prst="rect">
+              <a:avLst/>
+            </a:prstGeom>
+            <a:noFill/>
+          </p:spPr>
+          <p:txBody>
+            <a:bodyPr wrap="square" rtlCol="0">
+              <a:spAutoFit/>
+            </a:bodyPr>
+            <a:lstStyle/>
+            <a:p>
+              <a:pPr algn="ctr"/>
+              <a:r>
+                <a:rPr lang="en-GB" sz="1200" dirty="0">
+                  <a:latin typeface="Helvetica" pitchFamily="2" charset="0"/>
+                </a:rPr>
+                <a:t>Dataset Split</a:t>
+              </a:r>
+            </a:p>
+          </p:txBody>
+        </p:sp>
+      </p:grpSp>
+      <p:grpSp>
+        <p:nvGrpSpPr>
+          <p:cNvPr id="66" name="Group 65">
+            <a:extLst>
+              <a:ext uri="{FF2B5EF4-FFF2-40B4-BE49-F238E27FC236}">
+                <a16:creationId xmlns:a16="http://schemas.microsoft.com/office/drawing/2014/main" id="{4C49AFD8-5070-1F85-71A9-A308B1B9078B}"/>
+              </a:ext>
+            </a:extLst>
+          </p:cNvPr>
+          <p:cNvGrpSpPr/>
+          <p:nvPr/>
+        </p:nvGrpSpPr>
+        <p:grpSpPr>
+          <a:xfrm>
+            <a:off x="3780705" y="9745812"/>
+            <a:ext cx="2013251" cy="431468"/>
+            <a:chOff x="2805990" y="8955850"/>
+            <a:chExt cx="4238422" cy="431468"/>
+          </a:xfrm>
+          <a:solidFill>
+            <a:srgbClr val="92D050"/>
+          </a:solidFill>
+        </p:grpSpPr>
+        <p:sp>
+          <p:nvSpPr>
+            <p:cNvPr id="67" name="Down Arrow Callout 66">
+              <a:extLst>
+                <a:ext uri="{FF2B5EF4-FFF2-40B4-BE49-F238E27FC236}">
+                  <a16:creationId xmlns:a16="http://schemas.microsoft.com/office/drawing/2014/main" id="{E3DAF321-5F75-FE73-4449-86DC7DDFA3B7}"/>
+                </a:ext>
+              </a:extLst>
+            </p:cNvPr>
+            <p:cNvSpPr/>
+            <p:nvPr/>
+          </p:nvSpPr>
+          <p:spPr>
+            <a:xfrm>
+              <a:off x="2805990" y="8955850"/>
+              <a:ext cx="4238422" cy="431468"/>
+            </a:xfrm>
+            <a:prstGeom prst="downArrowCallout">
+              <a:avLst>
+                <a:gd name="adj1" fmla="val 127277"/>
+                <a:gd name="adj2" fmla="val 119161"/>
+                <a:gd name="adj3" fmla="val 25000"/>
+                <a:gd name="adj4" fmla="val 64977"/>
+              </a:avLst>
+            </a:prstGeom>
+            <a:solidFill>
+              <a:schemeClr val="accent6"/>
+            </a:solidFill>
+            <a:ln>
+              <a:solidFill>
+                <a:schemeClr val="accent2">
+                  <a:lumMod val="75000"/>
+                </a:schemeClr>
+              </a:solidFill>
+            </a:ln>
+          </p:spPr>
+          <p:style>
+            <a:lnRef idx="2">
+              <a:schemeClr val="accent1">
+                <a:shade val="15000"/>
+              </a:schemeClr>
+            </a:lnRef>
+            <a:fillRef idx="1">
+              <a:schemeClr val="accent1"/>
+            </a:fillRef>
+            <a:effectRef idx="0">
+              <a:schemeClr val="accent1"/>
+            </a:effectRef>
+            <a:fontRef idx="minor">
+              <a:schemeClr val="lt1"/>
+            </a:fontRef>
+          </p:style>
+          <p:txBody>
+            <a:bodyPr rtlCol="0" anchor="ctr"/>
+            <a:lstStyle/>
+            <a:p>
+              <a:pPr algn="ctr"/>
+              <a:endParaRPr lang="en-GB">
+                <a:solidFill>
+                  <a:sysClr val="windowText" lastClr="000000"/>
+                </a:solidFill>
+              </a:endParaRPr>
+            </a:p>
+          </p:txBody>
+        </p:sp>
+        <p:sp>
+          <p:nvSpPr>
+            <p:cNvPr id="68" name="TextBox 67">
+              <a:extLst>
+                <a:ext uri="{FF2B5EF4-FFF2-40B4-BE49-F238E27FC236}">
+                  <a16:creationId xmlns:a16="http://schemas.microsoft.com/office/drawing/2014/main" id="{D2915426-3519-C02D-AA16-F4A6CDD267D7}"/>
+                </a:ext>
+              </a:extLst>
+            </p:cNvPr>
+            <p:cNvSpPr txBox="1"/>
+            <p:nvPr/>
+          </p:nvSpPr>
+          <p:spPr>
+            <a:xfrm>
+              <a:off x="3197901" y="8961931"/>
+              <a:ext cx="3454912" cy="276999"/>
+            </a:xfrm>
+            <a:prstGeom prst="rect">
+              <a:avLst/>
+            </a:prstGeom>
+            <a:noFill/>
+          </p:spPr>
+          <p:txBody>
+            <a:bodyPr wrap="square" rtlCol="0">
+              <a:spAutoFit/>
+            </a:bodyPr>
+            <a:lstStyle/>
+            <a:p>
+              <a:pPr algn="ctr"/>
+              <a:r>
+                <a:rPr lang="en-GB" sz="1200" dirty="0">
+                  <a:latin typeface="Helvetica" pitchFamily="2" charset="0"/>
+                </a:rPr>
+                <a:t>Data Augmentation</a:t>
+              </a:r>
+            </a:p>
+          </p:txBody>
+        </p:sp>
+      </p:grpSp>
+      <p:grpSp>
+        <p:nvGrpSpPr>
+          <p:cNvPr id="69" name="Group 68">
+            <a:extLst>
+              <a:ext uri="{FF2B5EF4-FFF2-40B4-BE49-F238E27FC236}">
+                <a16:creationId xmlns:a16="http://schemas.microsoft.com/office/drawing/2014/main" id="{15400404-6A6D-6AE3-3345-7A9E40CCDC6C}"/>
+              </a:ext>
+            </a:extLst>
+          </p:cNvPr>
+          <p:cNvGrpSpPr/>
+          <p:nvPr/>
+        </p:nvGrpSpPr>
+        <p:grpSpPr>
+          <a:xfrm>
+            <a:off x="3780705" y="10258201"/>
+            <a:ext cx="2013251" cy="431468"/>
+            <a:chOff x="2805990" y="8955850"/>
+            <a:chExt cx="4238422" cy="431468"/>
+          </a:xfrm>
+          <a:solidFill>
+            <a:srgbClr val="92D050"/>
+          </a:solidFill>
+        </p:grpSpPr>
+        <p:sp>
+          <p:nvSpPr>
+            <p:cNvPr id="70" name="Down Arrow Callout 69">
+              <a:extLst>
+                <a:ext uri="{FF2B5EF4-FFF2-40B4-BE49-F238E27FC236}">
+                  <a16:creationId xmlns:a16="http://schemas.microsoft.com/office/drawing/2014/main" id="{D4FB8808-6AA2-18CF-816F-9AE9317E110D}"/>
+                </a:ext>
+              </a:extLst>
+            </p:cNvPr>
+            <p:cNvSpPr/>
+            <p:nvPr/>
+          </p:nvSpPr>
+          <p:spPr>
+            <a:xfrm>
+              <a:off x="2805990" y="8955850"/>
+              <a:ext cx="4238422" cy="431468"/>
+            </a:xfrm>
+            <a:prstGeom prst="downArrowCallout">
+              <a:avLst>
+                <a:gd name="adj1" fmla="val 127277"/>
+                <a:gd name="adj2" fmla="val 119161"/>
+                <a:gd name="adj3" fmla="val 25000"/>
+                <a:gd name="adj4" fmla="val 64977"/>
+              </a:avLst>
+            </a:prstGeom>
+            <a:solidFill>
+              <a:schemeClr val="accent2">
+                <a:lumMod val="40000"/>
+                <a:lumOff val="60000"/>
+              </a:schemeClr>
+            </a:solidFill>
+            <a:ln>
+              <a:solidFill>
+                <a:schemeClr val="accent2">
+                  <a:lumMod val="75000"/>
+                </a:schemeClr>
+              </a:solidFill>
+            </a:ln>
+          </p:spPr>
+          <p:style>
+            <a:lnRef idx="2">
+              <a:schemeClr val="accent1">
+                <a:shade val="15000"/>
+              </a:schemeClr>
+            </a:lnRef>
+            <a:fillRef idx="1">
+              <a:schemeClr val="accent1"/>
+            </a:fillRef>
+            <a:effectRef idx="0">
+              <a:schemeClr val="accent1"/>
+            </a:effectRef>
+            <a:fontRef idx="minor">
+              <a:schemeClr val="lt1"/>
+            </a:fontRef>
+          </p:style>
+          <p:txBody>
+            <a:bodyPr rtlCol="0" anchor="ctr"/>
+            <a:lstStyle/>
+            <a:p>
+              <a:pPr algn="ctr"/>
+              <a:endParaRPr lang="en-GB">
+                <a:solidFill>
+                  <a:sysClr val="windowText" lastClr="000000"/>
+                </a:solidFill>
+              </a:endParaRPr>
+            </a:p>
+          </p:txBody>
+        </p:sp>
+        <p:sp>
+          <p:nvSpPr>
+            <p:cNvPr id="71" name="TextBox 70">
+              <a:extLst>
+                <a:ext uri="{FF2B5EF4-FFF2-40B4-BE49-F238E27FC236}">
+                  <a16:creationId xmlns:a16="http://schemas.microsoft.com/office/drawing/2014/main" id="{ED6CD35A-C02A-81AB-C08E-910F5DCA9AF5}"/>
+                </a:ext>
+              </a:extLst>
+            </p:cNvPr>
+            <p:cNvSpPr txBox="1"/>
+            <p:nvPr/>
+          </p:nvSpPr>
+          <p:spPr>
+            <a:xfrm>
+              <a:off x="3197901" y="8961931"/>
+              <a:ext cx="3454912" cy="276999"/>
+            </a:xfrm>
+            <a:prstGeom prst="rect">
+              <a:avLst/>
+            </a:prstGeom>
+            <a:noFill/>
+          </p:spPr>
+          <p:txBody>
+            <a:bodyPr wrap="square" rtlCol="0">
+              <a:spAutoFit/>
+            </a:bodyPr>
+            <a:lstStyle/>
+            <a:p>
+              <a:pPr algn="ctr"/>
+              <a:r>
+                <a:rPr lang="en-GB" sz="1200" dirty="0">
+                  <a:latin typeface="Helvetica" pitchFamily="2" charset="0"/>
+                </a:rPr>
+                <a:t>Training</a:t>
+              </a:r>
+            </a:p>
+          </p:txBody>
+        </p:sp>
+      </p:grpSp>
+      <p:grpSp>
+        <p:nvGrpSpPr>
+          <p:cNvPr id="72" name="Group 71">
+            <a:extLst>
+              <a:ext uri="{FF2B5EF4-FFF2-40B4-BE49-F238E27FC236}">
+                <a16:creationId xmlns:a16="http://schemas.microsoft.com/office/drawing/2014/main" id="{2E4D234D-4E59-E027-FC01-98796F19A889}"/>
+              </a:ext>
+            </a:extLst>
+          </p:cNvPr>
+          <p:cNvGrpSpPr/>
+          <p:nvPr/>
+        </p:nvGrpSpPr>
+        <p:grpSpPr>
+          <a:xfrm>
+            <a:off x="3780705" y="10799762"/>
+            <a:ext cx="2013251" cy="431468"/>
+            <a:chOff x="2805990" y="8955850"/>
+            <a:chExt cx="4238422" cy="431468"/>
+          </a:xfrm>
+          <a:solidFill>
+            <a:srgbClr val="92D050"/>
+          </a:solidFill>
+        </p:grpSpPr>
+        <p:sp>
+          <p:nvSpPr>
+            <p:cNvPr id="73" name="Down Arrow Callout 72">
+              <a:extLst>
+                <a:ext uri="{FF2B5EF4-FFF2-40B4-BE49-F238E27FC236}">
+                  <a16:creationId xmlns:a16="http://schemas.microsoft.com/office/drawing/2014/main" id="{FFBBCE95-81DE-B984-08BE-7D9CE9E6840E}"/>
+                </a:ext>
+              </a:extLst>
+            </p:cNvPr>
+            <p:cNvSpPr/>
+            <p:nvPr/>
+          </p:nvSpPr>
+          <p:spPr>
+            <a:xfrm>
+              <a:off x="2805990" y="8955850"/>
+              <a:ext cx="4238422" cy="431468"/>
+            </a:xfrm>
+            <a:prstGeom prst="downArrowCallout">
+              <a:avLst>
+                <a:gd name="adj1" fmla="val 127277"/>
+                <a:gd name="adj2" fmla="val 119161"/>
+                <a:gd name="adj3" fmla="val 25000"/>
+                <a:gd name="adj4" fmla="val 64977"/>
+              </a:avLst>
+            </a:prstGeom>
+            <a:solidFill>
+              <a:schemeClr val="accent2">
+                <a:lumMod val="40000"/>
+                <a:lumOff val="60000"/>
+              </a:schemeClr>
+            </a:solidFill>
+            <a:ln>
+              <a:solidFill>
+                <a:schemeClr val="accent2">
+                  <a:lumMod val="75000"/>
+                </a:schemeClr>
+              </a:solidFill>
+            </a:ln>
+          </p:spPr>
+          <p:style>
+            <a:lnRef idx="2">
+              <a:schemeClr val="accent1">
+                <a:shade val="15000"/>
+              </a:schemeClr>
+            </a:lnRef>
+            <a:fillRef idx="1">
+              <a:schemeClr val="accent1"/>
+            </a:fillRef>
+            <a:effectRef idx="0">
+              <a:schemeClr val="accent1"/>
+            </a:effectRef>
+            <a:fontRef idx="minor">
+              <a:schemeClr val="lt1"/>
+            </a:fontRef>
+          </p:style>
+          <p:txBody>
+            <a:bodyPr rtlCol="0" anchor="ctr"/>
+            <a:lstStyle/>
+            <a:p>
+              <a:pPr algn="ctr"/>
+              <a:endParaRPr lang="en-GB">
+                <a:solidFill>
+                  <a:sysClr val="windowText" lastClr="000000"/>
+                </a:solidFill>
+              </a:endParaRPr>
+            </a:p>
+          </p:txBody>
+        </p:sp>
+        <p:sp>
+          <p:nvSpPr>
+            <p:cNvPr id="74" name="TextBox 73">
+              <a:extLst>
+                <a:ext uri="{FF2B5EF4-FFF2-40B4-BE49-F238E27FC236}">
+                  <a16:creationId xmlns:a16="http://schemas.microsoft.com/office/drawing/2014/main" id="{2CDD1F92-1CC2-319B-E641-D63C64A961FF}"/>
+                </a:ext>
+              </a:extLst>
+            </p:cNvPr>
+            <p:cNvSpPr txBox="1"/>
+            <p:nvPr/>
+          </p:nvSpPr>
+          <p:spPr>
+            <a:xfrm>
+              <a:off x="3197901" y="8961931"/>
+              <a:ext cx="3454912" cy="276999"/>
+            </a:xfrm>
+            <a:prstGeom prst="rect">
+              <a:avLst/>
+            </a:prstGeom>
+            <a:noFill/>
+          </p:spPr>
+          <p:txBody>
+            <a:bodyPr wrap="square" rtlCol="0">
+              <a:spAutoFit/>
+            </a:bodyPr>
+            <a:lstStyle/>
+            <a:p>
+              <a:pPr algn="ctr"/>
+              <a:r>
+                <a:rPr lang="en-GB" sz="1200" dirty="0">
+                  <a:latin typeface="Helvetica" pitchFamily="2" charset="0"/>
+                </a:rPr>
+                <a:t>Evaluation</a:t>
+              </a:r>
+            </a:p>
+          </p:txBody>
+        </p:sp>
+      </p:grpSp>
+      <p:sp>
+        <p:nvSpPr>
+          <p:cNvPr id="84" name="TextBox 83">
+            <a:extLst>
+              <a:ext uri="{FF2B5EF4-FFF2-40B4-BE49-F238E27FC236}">
+                <a16:creationId xmlns:a16="http://schemas.microsoft.com/office/drawing/2014/main" id="{D0A9BCFA-AA5B-6E55-265D-81A4DF569B8F}"/>
+              </a:ext>
+            </a:extLst>
+          </p:cNvPr>
+          <p:cNvSpPr txBox="1"/>
+          <p:nvPr/>
+        </p:nvSpPr>
+        <p:spPr>
+          <a:xfrm>
+            <a:off x="3493328" y="8860491"/>
+            <a:ext cx="2619937" cy="276999"/>
+          </a:xfrm>
+          <a:prstGeom prst="rect">
+            <a:avLst/>
+          </a:prstGeom>
+          <a:solidFill>
+            <a:schemeClr val="accent6"/>
+          </a:solidFill>
+          <a:ln w="12700">
+            <a:solidFill>
+              <a:schemeClr val="accent2">
+                <a:lumMod val="75000"/>
+              </a:schemeClr>
+            </a:solidFill>
+          </a:ln>
+        </p:spPr>
+        <p:txBody>
+          <a:bodyPr wrap="square" rtlCol="0">
+            <a:spAutoFit/>
+          </a:bodyPr>
+          <a:lstStyle/>
+          <a:p>
+            <a:pPr algn="ctr"/>
+            <a:r>
+              <a:rPr lang="en-GB" sz="1200" dirty="0">
+                <a:latin typeface="Helvetica" pitchFamily="2" charset="0"/>
+              </a:rPr>
+              <a:t>Classification</a:t>
+            </a:r>
+          </a:p>
+        </p:txBody>
+      </p:sp>
+      <p:grpSp>
+        <p:nvGrpSpPr>
+          <p:cNvPr id="95" name="Group 94">
+            <a:extLst>
+              <a:ext uri="{FF2B5EF4-FFF2-40B4-BE49-F238E27FC236}">
+                <a16:creationId xmlns:a16="http://schemas.microsoft.com/office/drawing/2014/main" id="{D51A8294-BC5A-1A17-978C-0F6718B85E01}"/>
+              </a:ext>
+            </a:extLst>
+          </p:cNvPr>
+          <p:cNvGrpSpPr/>
+          <p:nvPr/>
+        </p:nvGrpSpPr>
+        <p:grpSpPr>
+          <a:xfrm>
+            <a:off x="3237606" y="12048516"/>
+            <a:ext cx="2952127" cy="348343"/>
+            <a:chOff x="2032488" y="7523831"/>
+            <a:chExt cx="3073400" cy="348343"/>
+          </a:xfrm>
+        </p:grpSpPr>
+        <p:sp>
+          <p:nvSpPr>
+            <p:cNvPr id="96" name="Data 95">
+              <a:extLst>
+                <a:ext uri="{FF2B5EF4-FFF2-40B4-BE49-F238E27FC236}">
+                  <a16:creationId xmlns:a16="http://schemas.microsoft.com/office/drawing/2014/main" id="{5EDA9C9D-B829-F8D9-62C3-10CC486B4A44}"/>
+                </a:ext>
+              </a:extLst>
+            </p:cNvPr>
+            <p:cNvSpPr/>
+            <p:nvPr/>
+          </p:nvSpPr>
+          <p:spPr>
+            <a:xfrm>
+              <a:off x="2032488" y="7523831"/>
+              <a:ext cx="3073400" cy="348343"/>
+            </a:xfrm>
+            <a:prstGeom prst="flowChartInputOutput">
+              <a:avLst/>
+            </a:prstGeom>
+            <a:solidFill>
+              <a:schemeClr val="accent1">
+                <a:lumMod val="40000"/>
+                <a:lumOff val="60000"/>
+              </a:schemeClr>
+            </a:solidFill>
+            <a:ln>
+              <a:solidFill>
+                <a:schemeClr val="accent1">
+                  <a:lumMod val="50000"/>
+                </a:schemeClr>
+              </a:solidFill>
+            </a:ln>
+          </p:spPr>
+          <p:style>
+            <a:lnRef idx="2">
+              <a:schemeClr val="accent1">
+                <a:shade val="15000"/>
+              </a:schemeClr>
+            </a:lnRef>
+            <a:fillRef idx="1">
+              <a:schemeClr val="accent1"/>
+            </a:fillRef>
+            <a:effectRef idx="0">
+              <a:schemeClr val="accent1"/>
+            </a:effectRef>
+            <a:fontRef idx="minor">
+              <a:schemeClr val="lt1"/>
+            </a:fontRef>
+          </p:style>
+          <p:txBody>
+            <a:bodyPr rtlCol="0" anchor="ctr"/>
+            <a:lstStyle/>
+            <a:p>
+              <a:pPr algn="ctr"/>
+              <a:endParaRPr lang="en-GB">
+                <a:solidFill>
+                  <a:schemeClr val="accent1">
+                    <a:lumMod val="60000"/>
+                    <a:lumOff val="40000"/>
+                  </a:schemeClr>
+                </a:solidFill>
+              </a:endParaRPr>
+            </a:p>
+          </p:txBody>
+        </p:sp>
+        <p:sp>
+          <p:nvSpPr>
+            <p:cNvPr id="97" name="TextBox 96">
+              <a:extLst>
+                <a:ext uri="{FF2B5EF4-FFF2-40B4-BE49-F238E27FC236}">
+                  <a16:creationId xmlns:a16="http://schemas.microsoft.com/office/drawing/2014/main" id="{962A2811-5698-017F-5BD6-2B378137C62B}"/>
+                </a:ext>
+              </a:extLst>
+            </p:cNvPr>
+            <p:cNvSpPr txBox="1"/>
+            <p:nvPr/>
+          </p:nvSpPr>
+          <p:spPr>
+            <a:xfrm>
+              <a:off x="2440604" y="7561552"/>
+              <a:ext cx="2257168" cy="276999"/>
+            </a:xfrm>
+            <a:prstGeom prst="rect">
+              <a:avLst/>
+            </a:prstGeom>
+            <a:noFill/>
+          </p:spPr>
+          <p:txBody>
+            <a:bodyPr wrap="square" rtlCol="0">
+              <a:spAutoFit/>
+            </a:bodyPr>
+            <a:lstStyle/>
+            <a:p>
+              <a:pPr algn="ctr"/>
+              <a:r>
+                <a:rPr lang="en-GB" sz="1200" dirty="0">
+                  <a:latin typeface="Helvetica" pitchFamily="2" charset="0"/>
+                </a:rPr>
+                <a:t>Model-classified images</a:t>
+              </a:r>
+            </a:p>
+          </p:txBody>
+        </p:sp>
+      </p:grpSp>
+      <p:sp>
+        <p:nvSpPr>
+          <p:cNvPr id="111" name="Rectangle 110">
+            <a:extLst>
+              <a:ext uri="{FF2B5EF4-FFF2-40B4-BE49-F238E27FC236}">
+                <a16:creationId xmlns:a16="http://schemas.microsoft.com/office/drawing/2014/main" id="{D259ED07-684C-4670-6CBB-8691C1BE7EBE}"/>
+              </a:ext>
+            </a:extLst>
+          </p:cNvPr>
+          <p:cNvSpPr/>
+          <p:nvPr/>
+        </p:nvSpPr>
+        <p:spPr>
+          <a:xfrm>
+            <a:off x="8545010" y="782263"/>
+            <a:ext cx="2171196" cy="341928"/>
+          </a:xfrm>
+          <a:prstGeom prst="rect">
+            <a:avLst/>
+          </a:prstGeom>
+          <a:solidFill>
+            <a:schemeClr val="accent6"/>
+          </a:solidFill>
+          <a:ln>
+            <a:solidFill>
+              <a:schemeClr val="accent6">
+                <a:lumMod val="75000"/>
+              </a:schemeClr>
+            </a:solidFill>
+          </a:ln>
+        </p:spPr>
+        <p:style>
+          <a:lnRef idx="2">
+            <a:schemeClr val="accent1">
+              <a:shade val="15000"/>
+            </a:schemeClr>
+          </a:lnRef>
+          <a:fillRef idx="1">
+            <a:schemeClr val="accent1"/>
+          </a:fillRef>
+          <a:effectRef idx="0">
+            <a:schemeClr val="accent1"/>
+          </a:effectRef>
+          <a:fontRef idx="minor">
+            <a:schemeClr val="lt1"/>
+          </a:fontRef>
+        </p:style>
+        <p:txBody>
+          <a:bodyPr rtlCol="0" anchor="ctr"/>
+          <a:lstStyle/>
+          <a:p>
+            <a:pPr algn="ctr"/>
+            <a:endParaRPr lang="en-GB"/>
+          </a:p>
+        </p:txBody>
+      </p:sp>
+      <p:sp>
+        <p:nvSpPr>
+          <p:cNvPr id="112" name="TextBox 111">
+            <a:extLst>
+              <a:ext uri="{FF2B5EF4-FFF2-40B4-BE49-F238E27FC236}">
+                <a16:creationId xmlns:a16="http://schemas.microsoft.com/office/drawing/2014/main" id="{A58DB884-3B29-326E-117A-AE5DEE5089D8}"/>
+              </a:ext>
+            </a:extLst>
+          </p:cNvPr>
+          <p:cNvSpPr txBox="1"/>
+          <p:nvPr/>
+        </p:nvSpPr>
+        <p:spPr>
+          <a:xfrm>
+            <a:off x="8502024" y="814727"/>
+            <a:ext cx="2257168" cy="276999"/>
+          </a:xfrm>
+          <a:prstGeom prst="rect">
+            <a:avLst/>
+          </a:prstGeom>
+          <a:noFill/>
+        </p:spPr>
+        <p:txBody>
+          <a:bodyPr wrap="square" rtlCol="0">
+            <a:spAutoFit/>
+          </a:bodyPr>
+          <a:lstStyle/>
+          <a:p>
+            <a:pPr algn="ctr"/>
+            <a:r>
+              <a:rPr lang="en-GB" sz="1200" dirty="0">
+                <a:latin typeface="Helvetica" pitchFamily="2" charset="0"/>
+              </a:rPr>
+              <a:t>Completed during Module 6</a:t>
+            </a:r>
+          </a:p>
+        </p:txBody>
+      </p:sp>
+      <p:sp>
+        <p:nvSpPr>
+          <p:cNvPr id="115" name="Rectangle 114">
+            <a:extLst>
+              <a:ext uri="{FF2B5EF4-FFF2-40B4-BE49-F238E27FC236}">
+                <a16:creationId xmlns:a16="http://schemas.microsoft.com/office/drawing/2014/main" id="{C31823D1-E063-90DC-3206-D7D3527BB05F}"/>
+              </a:ext>
+            </a:extLst>
+          </p:cNvPr>
+          <p:cNvSpPr/>
+          <p:nvPr/>
+        </p:nvSpPr>
+        <p:spPr>
+          <a:xfrm>
+            <a:off x="8545010" y="1403823"/>
+            <a:ext cx="2171196" cy="286066"/>
+          </a:xfrm>
+          <a:prstGeom prst="rect">
+            <a:avLst/>
+          </a:prstGeom>
+          <a:solidFill>
+            <a:schemeClr val="accent2">
+              <a:lumMod val="60000"/>
+              <a:lumOff val="40000"/>
+            </a:schemeClr>
+          </a:solidFill>
+          <a:ln>
+            <a:solidFill>
+              <a:schemeClr val="accent2">
+                <a:lumMod val="50000"/>
+              </a:schemeClr>
+            </a:solidFill>
+          </a:ln>
+        </p:spPr>
+        <p:style>
+          <a:lnRef idx="2">
+            <a:schemeClr val="accent1">
+              <a:shade val="15000"/>
+            </a:schemeClr>
+          </a:lnRef>
+          <a:fillRef idx="1">
+            <a:schemeClr val="accent1"/>
+          </a:fillRef>
+          <a:effectRef idx="0">
+            <a:schemeClr val="accent1"/>
+          </a:effectRef>
+          <a:fontRef idx="minor">
+            <a:schemeClr val="lt1"/>
+          </a:fontRef>
+        </p:style>
+        <p:txBody>
+          <a:bodyPr rtlCol="0" anchor="ctr"/>
+          <a:lstStyle/>
+          <a:p>
+            <a:pPr algn="ctr"/>
+            <a:endParaRPr lang="en-GB"/>
+          </a:p>
+        </p:txBody>
+      </p:sp>
+      <p:sp>
+        <p:nvSpPr>
+          <p:cNvPr id="116" name="TextBox 115">
+            <a:extLst>
+              <a:ext uri="{FF2B5EF4-FFF2-40B4-BE49-F238E27FC236}">
+                <a16:creationId xmlns:a16="http://schemas.microsoft.com/office/drawing/2014/main" id="{D6DE5A05-4572-8CE1-B926-6D4585C3D27B}"/>
+              </a:ext>
+            </a:extLst>
+          </p:cNvPr>
+          <p:cNvSpPr txBox="1"/>
+          <p:nvPr/>
+        </p:nvSpPr>
+        <p:spPr>
+          <a:xfrm>
+            <a:off x="8502024" y="1408356"/>
+            <a:ext cx="2257168" cy="276999"/>
+          </a:xfrm>
+          <a:prstGeom prst="rect">
+            <a:avLst/>
+          </a:prstGeom>
+          <a:noFill/>
+        </p:spPr>
+        <p:txBody>
+          <a:bodyPr wrap="square" rtlCol="0">
+            <a:spAutoFit/>
+          </a:bodyPr>
+          <a:lstStyle/>
+          <a:p>
+            <a:pPr algn="ctr"/>
+            <a:r>
+              <a:rPr lang="en-GB" sz="1200" dirty="0">
+                <a:latin typeface="Helvetica" pitchFamily="2" charset="0"/>
+              </a:rPr>
+              <a:t>Completed during final project</a:t>
+            </a:r>
+          </a:p>
+        </p:txBody>
+      </p:sp>
+      <p:grpSp>
+        <p:nvGrpSpPr>
+          <p:cNvPr id="117" name="Group 116">
+            <a:extLst>
+              <a:ext uri="{FF2B5EF4-FFF2-40B4-BE49-F238E27FC236}">
+                <a16:creationId xmlns:a16="http://schemas.microsoft.com/office/drawing/2014/main" id="{4E8C2C8F-7F8D-FD07-BD3E-8A9A9058A6FA}"/>
+              </a:ext>
+            </a:extLst>
+          </p:cNvPr>
+          <p:cNvGrpSpPr/>
+          <p:nvPr/>
+        </p:nvGrpSpPr>
+        <p:grpSpPr>
+          <a:xfrm>
+            <a:off x="8545010" y="1916566"/>
+            <a:ext cx="2171196" cy="287910"/>
+            <a:chOff x="4709467" y="5096212"/>
+            <a:chExt cx="3073400" cy="350588"/>
+          </a:xfrm>
+        </p:grpSpPr>
+        <p:sp>
+          <p:nvSpPr>
+            <p:cNvPr id="118" name="Data 117">
+              <a:extLst>
+                <a:ext uri="{FF2B5EF4-FFF2-40B4-BE49-F238E27FC236}">
+                  <a16:creationId xmlns:a16="http://schemas.microsoft.com/office/drawing/2014/main" id="{75382A01-8AC1-C759-6593-06EE01B4831B}"/>
+                </a:ext>
+              </a:extLst>
+            </p:cNvPr>
+            <p:cNvSpPr/>
+            <p:nvPr/>
+          </p:nvSpPr>
+          <p:spPr>
+            <a:xfrm>
+              <a:off x="4709467" y="5096212"/>
+              <a:ext cx="3073400" cy="348343"/>
+            </a:xfrm>
+            <a:prstGeom prst="flowChartInputOutput">
+              <a:avLst/>
+            </a:prstGeom>
+            <a:solidFill>
+              <a:schemeClr val="accent1">
+                <a:lumMod val="40000"/>
+                <a:lumOff val="60000"/>
+              </a:schemeClr>
+            </a:solidFill>
+            <a:ln>
+              <a:solidFill>
+                <a:schemeClr val="accent1">
+                  <a:lumMod val="50000"/>
+                </a:schemeClr>
+              </a:solidFill>
+            </a:ln>
+          </p:spPr>
+          <p:style>
+            <a:lnRef idx="2">
+              <a:schemeClr val="accent1">
+                <a:shade val="15000"/>
+              </a:schemeClr>
+            </a:lnRef>
+            <a:fillRef idx="1">
+              <a:schemeClr val="accent1"/>
+            </a:fillRef>
+            <a:effectRef idx="0">
+              <a:schemeClr val="accent1"/>
+            </a:effectRef>
+            <a:fontRef idx="minor">
+              <a:schemeClr val="lt1"/>
+            </a:fontRef>
+          </p:style>
+          <p:txBody>
+            <a:bodyPr rtlCol="0" anchor="ctr"/>
+            <a:lstStyle/>
+            <a:p>
+              <a:pPr algn="ctr"/>
+              <a:endParaRPr lang="en-GB">
+                <a:solidFill>
+                  <a:schemeClr val="accent1">
+                    <a:lumMod val="60000"/>
+                    <a:lumOff val="40000"/>
+                  </a:schemeClr>
+                </a:solidFill>
+              </a:endParaRPr>
+            </a:p>
+          </p:txBody>
+        </p:sp>
+        <p:sp>
+          <p:nvSpPr>
+            <p:cNvPr id="119" name="TextBox 118">
+              <a:extLst>
+                <a:ext uri="{FF2B5EF4-FFF2-40B4-BE49-F238E27FC236}">
+                  <a16:creationId xmlns:a16="http://schemas.microsoft.com/office/drawing/2014/main" id="{2CC113F8-0A38-0EDC-B35E-FEA7291C5FF1}"/>
+                </a:ext>
+              </a:extLst>
+            </p:cNvPr>
+            <p:cNvSpPr txBox="1"/>
+            <p:nvPr/>
+          </p:nvSpPr>
+          <p:spPr>
+            <a:xfrm>
+              <a:off x="5117581" y="5109498"/>
+              <a:ext cx="2257168" cy="337302"/>
+            </a:xfrm>
+            <a:prstGeom prst="rect">
+              <a:avLst/>
+            </a:prstGeom>
+            <a:noFill/>
+          </p:spPr>
+          <p:txBody>
+            <a:bodyPr wrap="square" rtlCol="0">
+              <a:spAutoFit/>
+            </a:bodyPr>
+            <a:lstStyle/>
+            <a:p>
+              <a:pPr algn="ctr"/>
+              <a:r>
+                <a:rPr lang="en-GB" sz="1200" dirty="0">
+                  <a:latin typeface="Helvetica" pitchFamily="2" charset="0"/>
+                </a:rPr>
+                <a:t>Data product</a:t>
+              </a:r>
+            </a:p>
+          </p:txBody>
+        </p:sp>
+      </p:grpSp>
+      <p:sp>
+        <p:nvSpPr>
+          <p:cNvPr id="120" name="TextBox 119">
+            <a:extLst>
+              <a:ext uri="{FF2B5EF4-FFF2-40B4-BE49-F238E27FC236}">
+                <a16:creationId xmlns:a16="http://schemas.microsoft.com/office/drawing/2014/main" id="{A641BBC2-2A04-875D-8539-0B11D4222F45}"/>
+              </a:ext>
+            </a:extLst>
+          </p:cNvPr>
+          <p:cNvSpPr txBox="1"/>
+          <p:nvPr/>
+        </p:nvSpPr>
+        <p:spPr>
+          <a:xfrm>
+            <a:off x="8502024" y="472799"/>
+            <a:ext cx="2257168" cy="276999"/>
+          </a:xfrm>
+          <a:prstGeom prst="rect">
+            <a:avLst/>
+          </a:prstGeom>
+          <a:noFill/>
+        </p:spPr>
+        <p:txBody>
+          <a:bodyPr wrap="square" rtlCol="0">
+            <a:spAutoFit/>
+          </a:bodyPr>
+          <a:lstStyle/>
+          <a:p>
+            <a:pPr algn="just"/>
+            <a:r>
+              <a:rPr lang="en-GB" sz="1200" dirty="0">
+                <a:latin typeface="Helvetica" pitchFamily="2" charset="0"/>
+              </a:rPr>
+              <a:t>Legend:</a:t>
+            </a:r>
+          </a:p>
+        </p:txBody>
+      </p:sp>
+      <p:grpSp>
+        <p:nvGrpSpPr>
+          <p:cNvPr id="17" name="Group 16">
+            <a:extLst>
+              <a:ext uri="{FF2B5EF4-FFF2-40B4-BE49-F238E27FC236}">
+                <a16:creationId xmlns:a16="http://schemas.microsoft.com/office/drawing/2014/main" id="{E3629CBE-7E15-D7D0-6BA3-C24ACC888A97}"/>
+              </a:ext>
+            </a:extLst>
+          </p:cNvPr>
+          <p:cNvGrpSpPr/>
+          <p:nvPr/>
+        </p:nvGrpSpPr>
+        <p:grpSpPr>
+          <a:xfrm>
+            <a:off x="3350318" y="2946675"/>
+            <a:ext cx="2989111" cy="1407915"/>
+            <a:chOff x="2677884" y="315686"/>
+            <a:chExt cx="6313715" cy="1407915"/>
+          </a:xfrm>
+        </p:grpSpPr>
+        <p:sp>
+          <p:nvSpPr>
+            <p:cNvPr id="19" name="Down Arrow Callout 18">
+              <a:extLst>
+                <a:ext uri="{FF2B5EF4-FFF2-40B4-BE49-F238E27FC236}">
+                  <a16:creationId xmlns:a16="http://schemas.microsoft.com/office/drawing/2014/main" id="{D98F326C-7BF2-1EFF-BAF2-21CCCA708691}"/>
+                </a:ext>
+              </a:extLst>
+            </p:cNvPr>
+            <p:cNvSpPr/>
+            <p:nvPr/>
+          </p:nvSpPr>
+          <p:spPr>
+            <a:xfrm>
+              <a:off x="2677884" y="600890"/>
+              <a:ext cx="6313715" cy="1122711"/>
+            </a:xfrm>
+            <a:prstGeom prst="downArrowCallout">
+              <a:avLst>
+                <a:gd name="adj1" fmla="val 132914"/>
+                <a:gd name="adj2" fmla="val 102698"/>
+                <a:gd name="adj3" fmla="val 25000"/>
+                <a:gd name="adj4" fmla="val 64977"/>
+              </a:avLst>
+            </a:prstGeom>
+            <a:solidFill>
+              <a:schemeClr val="accent6"/>
+            </a:solidFill>
+            <a:ln>
+              <a:solidFill>
+                <a:schemeClr val="accent6">
+                  <a:lumMod val="75000"/>
+                </a:schemeClr>
+              </a:solidFill>
+            </a:ln>
+          </p:spPr>
+          <p:style>
+            <a:lnRef idx="2">
+              <a:schemeClr val="accent1">
+                <a:shade val="15000"/>
+              </a:schemeClr>
+            </a:lnRef>
+            <a:fillRef idx="1">
+              <a:schemeClr val="accent1"/>
+            </a:fillRef>
+            <a:effectRef idx="0">
+              <a:schemeClr val="accent1"/>
+            </a:effectRef>
+            <a:fontRef idx="minor">
+              <a:schemeClr val="lt1"/>
+            </a:fontRef>
+          </p:style>
+          <p:txBody>
+            <a:bodyPr rtlCol="0" anchor="ctr"/>
+            <a:lstStyle/>
+            <a:p>
+              <a:pPr algn="ctr"/>
+              <a:endParaRPr lang="en-GB">
+                <a:solidFill>
+                  <a:sysClr val="windowText" lastClr="000000"/>
+                </a:solidFill>
+              </a:endParaRPr>
+            </a:p>
+          </p:txBody>
+        </p:sp>
+        <p:sp>
+          <p:nvSpPr>
+            <p:cNvPr id="20" name="Rectangle 19">
+              <a:extLst>
+                <a:ext uri="{FF2B5EF4-FFF2-40B4-BE49-F238E27FC236}">
+                  <a16:creationId xmlns:a16="http://schemas.microsoft.com/office/drawing/2014/main" id="{61E5014F-8D0B-4E34-D06D-BB70EF6C47C4}"/>
+                </a:ext>
+              </a:extLst>
+            </p:cNvPr>
+            <p:cNvSpPr/>
+            <p:nvPr/>
+          </p:nvSpPr>
+          <p:spPr>
+            <a:xfrm>
+              <a:off x="2677884" y="315686"/>
+              <a:ext cx="6313715" cy="286066"/>
+            </a:xfrm>
+            <a:prstGeom prst="rect">
+              <a:avLst/>
+            </a:prstGeom>
+            <a:solidFill>
+              <a:schemeClr val="accent6"/>
+            </a:solidFill>
+            <a:ln>
+              <a:solidFill>
+                <a:schemeClr val="accent6">
+                  <a:lumMod val="75000"/>
+                </a:schemeClr>
+              </a:solidFill>
+            </a:ln>
+          </p:spPr>
+          <p:style>
+            <a:lnRef idx="2">
+              <a:schemeClr val="accent1">
+                <a:shade val="15000"/>
+              </a:schemeClr>
+            </a:lnRef>
+            <a:fillRef idx="1">
+              <a:schemeClr val="accent1"/>
+            </a:fillRef>
+            <a:effectRef idx="0">
+              <a:schemeClr val="accent1"/>
+            </a:effectRef>
+            <a:fontRef idx="minor">
+              <a:schemeClr val="lt1"/>
+            </a:fontRef>
+          </p:style>
+          <p:txBody>
+            <a:bodyPr rtlCol="0" anchor="ctr"/>
+            <a:lstStyle/>
+            <a:p>
+              <a:pPr algn="ctr"/>
+              <a:endParaRPr lang="en-GB">
+                <a:solidFill>
+                  <a:sysClr val="windowText" lastClr="000000"/>
+                </a:solidFill>
+              </a:endParaRPr>
+            </a:p>
+          </p:txBody>
+        </p:sp>
+      </p:grpSp>
+      <p:sp>
+        <p:nvSpPr>
+          <p:cNvPr id="21" name="TextBox 20">
+            <a:extLst>
+              <a:ext uri="{FF2B5EF4-FFF2-40B4-BE49-F238E27FC236}">
+                <a16:creationId xmlns:a16="http://schemas.microsoft.com/office/drawing/2014/main" id="{2D82F1A8-6865-D145-AD4D-78A9FE1F5B50}"/>
+              </a:ext>
+            </a:extLst>
+          </p:cNvPr>
+          <p:cNvSpPr txBox="1"/>
+          <p:nvPr/>
+        </p:nvSpPr>
+        <p:spPr>
+          <a:xfrm>
+            <a:off x="3623158" y="2953197"/>
+            <a:ext cx="2490107" cy="276999"/>
+          </a:xfrm>
+          <a:prstGeom prst="rect">
+            <a:avLst/>
+          </a:prstGeom>
+          <a:noFill/>
+        </p:spPr>
+        <p:txBody>
+          <a:bodyPr wrap="square" rtlCol="0">
+            <a:spAutoFit/>
+          </a:bodyPr>
+          <a:lstStyle/>
+          <a:p>
+            <a:pPr algn="ctr"/>
+            <a:r>
+              <a:rPr lang="en-GB" sz="1200" dirty="0">
+                <a:latin typeface="Helvetica" pitchFamily="2" charset="0"/>
+              </a:rPr>
+              <a:t>Image selection</a:t>
+            </a:r>
+          </a:p>
+        </p:txBody>
+      </p:sp>
+      <p:sp>
+        <p:nvSpPr>
+          <p:cNvPr id="23" name="TextBox 22">
+            <a:extLst>
+              <a:ext uri="{FF2B5EF4-FFF2-40B4-BE49-F238E27FC236}">
+                <a16:creationId xmlns:a16="http://schemas.microsoft.com/office/drawing/2014/main" id="{AEF045FE-1D6B-8C84-423A-E984FC051C9B}"/>
+              </a:ext>
+            </a:extLst>
+          </p:cNvPr>
+          <p:cNvSpPr txBox="1"/>
+          <p:nvPr/>
+        </p:nvSpPr>
+        <p:spPr>
+          <a:xfrm>
+            <a:off x="3350317" y="3234272"/>
+            <a:ext cx="2989111" cy="461665"/>
+          </a:xfrm>
+          <a:prstGeom prst="rect">
+            <a:avLst/>
+          </a:prstGeom>
+          <a:noFill/>
+        </p:spPr>
+        <p:txBody>
+          <a:bodyPr wrap="square" rtlCol="0">
+            <a:spAutoFit/>
+          </a:bodyPr>
+          <a:lstStyle/>
+          <a:p>
+            <a:r>
+              <a:rPr lang="en-GB" sz="1200" dirty="0">
+                <a:latin typeface="Helvetica" pitchFamily="2" charset="0"/>
+              </a:rPr>
+              <a:t>Based on known quality from visual analysis of drill core</a:t>
+            </a:r>
+          </a:p>
+        </p:txBody>
+      </p:sp>
+      <p:sp>
+        <p:nvSpPr>
+          <p:cNvPr id="24" name="Down Arrow 23">
+            <a:extLst>
+              <a:ext uri="{FF2B5EF4-FFF2-40B4-BE49-F238E27FC236}">
+                <a16:creationId xmlns:a16="http://schemas.microsoft.com/office/drawing/2014/main" id="{8A83E823-9005-2427-977E-D72B7AB0C391}"/>
+              </a:ext>
+            </a:extLst>
+          </p:cNvPr>
+          <p:cNvSpPr/>
+          <p:nvPr/>
+        </p:nvSpPr>
+        <p:spPr>
+          <a:xfrm>
+            <a:off x="4498939" y="2469741"/>
+            <a:ext cx="971485" cy="348343"/>
+          </a:xfrm>
+          <a:prstGeom prst="downArrow">
+            <a:avLst/>
+          </a:prstGeom>
+          <a:solidFill>
+            <a:schemeClr val="accent1">
+              <a:lumMod val="40000"/>
+              <a:lumOff val="60000"/>
+            </a:schemeClr>
+          </a:solidFill>
+          <a:ln>
+            <a:solidFill>
+              <a:schemeClr val="accent1">
+                <a:lumMod val="50000"/>
+              </a:schemeClr>
+            </a:solidFill>
+          </a:ln>
+        </p:spPr>
+        <p:style>
+          <a:lnRef idx="2">
+            <a:schemeClr val="accent1">
+              <a:shade val="15000"/>
+            </a:schemeClr>
+          </a:lnRef>
+          <a:fillRef idx="1">
+            <a:schemeClr val="accent1"/>
+          </a:fillRef>
+          <a:effectRef idx="0">
+            <a:schemeClr val="accent1"/>
+          </a:effectRef>
+          <a:fontRef idx="minor">
+            <a:schemeClr val="lt1"/>
+          </a:fontRef>
+        </p:style>
+        <p:txBody>
+          <a:bodyPr rtlCol="0" anchor="ctr"/>
+          <a:lstStyle/>
+          <a:p>
+            <a:pPr algn="ctr"/>
+            <a:endParaRPr lang="en-GB"/>
+          </a:p>
+        </p:txBody>
+      </p:sp>
+    </p:spTree>
+    <p:extLst>
+      <p:ext uri="{BB962C8B-B14F-4D97-AF65-F5344CB8AC3E}">
+        <p14:creationId xmlns:p14="http://schemas.microsoft.com/office/powerpoint/2010/main" val="770949584"/>
+      </p:ext>
+    </p:extLst>
+  </p:cSld>
+  <p:clrMapOvr>
+    <a:masterClrMapping/>
+  </p:clrMapOvr>
+</p:sld>
+</file>
+
 <file path=ppt/theme/theme1.xml><?xml version="1.0" encoding="utf-8"?>
 <a:theme xmlns:a="http://schemas.openxmlformats.org/drawingml/2006/main" name="Office Theme">
   <a:themeElements>

</xml_diff>

<commit_message>
Final project commit. Minor code cleanup.
</commit_message>
<xml_diff>
--- a/CAS_project/figures.pptx
+++ b/CAS_project/figures.pptx
@@ -10643,7 +10643,13 @@
           <p:cNvGraphicFramePr>
             <a:graphicFrameLocks noGrp="1"/>
           </p:cNvGraphicFramePr>
-          <p:nvPr/>
+          <p:nvPr>
+            <p:extLst>
+              <p:ext uri="{D42A27DB-BD31-4B8C-83A1-F6EECF244321}">
+                <p14:modId xmlns:p14="http://schemas.microsoft.com/office/powerpoint/2010/main" val="4207679092"/>
+              </p:ext>
+            </p:extLst>
+          </p:nvPr>
         </p:nvGraphicFramePr>
         <p:xfrm>
           <a:off x="2459665" y="814498"/>

</xml_diff>